<commit_message>
Correction de quelques commentaires
</commit_message>
<xml_diff>
--- a/Poster_TdLOG.pptx
+++ b/Poster_TdLOG.pptx
@@ -158,7 +158,7 @@
           </a:lstStyle>
           <a:p>
             <a:r>
-              <a:rPr lang="en-US" smtClean="0"/>
+              <a:rPr lang="en-US"/>
               <a:t>Click to edit Master title style</a:t>
             </a:r>
             <a:endParaRPr lang="en-US" dirty="0"/>
@@ -223,7 +223,7 @@
           </a:lstStyle>
           <a:p>
             <a:r>
-              <a:rPr lang="en-US" smtClean="0"/>
+              <a:rPr lang="en-US"/>
               <a:t>Click to edit Master subtitle style</a:t>
             </a:r>
             <a:endParaRPr lang="en-US" dirty="0"/>
@@ -289,7 +289,7 @@
           <a:p>
             <a:fld id="{0E1C6588-574C-564D-9A5F-65E9E31ED340}" type="slidenum">
               <a:rPr lang="fr-FR" smtClean="0"/>
-              <a:t>‹#›</a:t>
+              <a:t>‹N°›</a:t>
             </a:fld>
             <a:endParaRPr lang="fr-FR"/>
           </a:p>
@@ -341,7 +341,7 @@
           <a:lstStyle/>
           <a:p>
             <a:r>
-              <a:rPr lang="en-US" smtClean="0"/>
+              <a:rPr lang="en-US"/>
               <a:t>Click to edit Master title style</a:t>
             </a:r>
             <a:endParaRPr lang="en-US" dirty="0"/>
@@ -365,35 +365,35 @@
           <a:p>
             <a:pPr lvl="0"/>
             <a:r>
-              <a:rPr lang="en-US" smtClean="0"/>
+              <a:rPr lang="en-US"/>
               <a:t>Click to edit Master text styles</a:t>
             </a:r>
           </a:p>
           <a:p>
             <a:pPr lvl="1"/>
             <a:r>
-              <a:rPr lang="en-US" smtClean="0"/>
+              <a:rPr lang="en-US"/>
               <a:t>Second level</a:t>
             </a:r>
           </a:p>
           <a:p>
             <a:pPr lvl="2"/>
             <a:r>
-              <a:rPr lang="en-US" smtClean="0"/>
+              <a:rPr lang="en-US"/>
               <a:t>Third level</a:t>
             </a:r>
           </a:p>
           <a:p>
             <a:pPr lvl="3"/>
             <a:r>
-              <a:rPr lang="en-US" smtClean="0"/>
+              <a:rPr lang="en-US"/>
               <a:t>Fourth level</a:t>
             </a:r>
           </a:p>
           <a:p>
             <a:pPr lvl="4"/>
             <a:r>
-              <a:rPr lang="en-US" smtClean="0"/>
+              <a:rPr lang="en-US"/>
               <a:t>Fifth level</a:t>
             </a:r>
             <a:endParaRPr lang="en-US" dirty="0"/>
@@ -459,7 +459,7 @@
           <a:p>
             <a:fld id="{0E1C6588-574C-564D-9A5F-65E9E31ED340}" type="slidenum">
               <a:rPr lang="fr-FR" smtClean="0"/>
-              <a:t>‹#›</a:t>
+              <a:t>‹N°›</a:t>
             </a:fld>
             <a:endParaRPr lang="fr-FR"/>
           </a:p>
@@ -516,7 +516,7 @@
           <a:lstStyle/>
           <a:p>
             <a:r>
-              <a:rPr lang="en-US" smtClean="0"/>
+              <a:rPr lang="en-US"/>
               <a:t>Click to edit Master title style</a:t>
             </a:r>
             <a:endParaRPr lang="en-US" dirty="0"/>
@@ -545,35 +545,35 @@
           <a:p>
             <a:pPr lvl="0"/>
             <a:r>
-              <a:rPr lang="en-US" smtClean="0"/>
+              <a:rPr lang="en-US"/>
               <a:t>Click to edit Master text styles</a:t>
             </a:r>
           </a:p>
           <a:p>
             <a:pPr lvl="1"/>
             <a:r>
-              <a:rPr lang="en-US" smtClean="0"/>
+              <a:rPr lang="en-US"/>
               <a:t>Second level</a:t>
             </a:r>
           </a:p>
           <a:p>
             <a:pPr lvl="2"/>
             <a:r>
-              <a:rPr lang="en-US" smtClean="0"/>
+              <a:rPr lang="en-US"/>
               <a:t>Third level</a:t>
             </a:r>
           </a:p>
           <a:p>
             <a:pPr lvl="3"/>
             <a:r>
-              <a:rPr lang="en-US" smtClean="0"/>
+              <a:rPr lang="en-US"/>
               <a:t>Fourth level</a:t>
             </a:r>
           </a:p>
           <a:p>
             <a:pPr lvl="4"/>
             <a:r>
-              <a:rPr lang="en-US" smtClean="0"/>
+              <a:rPr lang="en-US"/>
               <a:t>Fifth level</a:t>
             </a:r>
             <a:endParaRPr lang="en-US" dirty="0"/>
@@ -639,7 +639,7 @@
           <a:p>
             <a:fld id="{0E1C6588-574C-564D-9A5F-65E9E31ED340}" type="slidenum">
               <a:rPr lang="fr-FR" smtClean="0"/>
-              <a:t>‹#›</a:t>
+              <a:t>‹N°›</a:t>
             </a:fld>
             <a:endParaRPr lang="fr-FR"/>
           </a:p>
@@ -691,7 +691,7 @@
           <a:lstStyle/>
           <a:p>
             <a:r>
-              <a:rPr lang="en-US" smtClean="0"/>
+              <a:rPr lang="en-US"/>
               <a:t>Click to edit Master title style</a:t>
             </a:r>
             <a:endParaRPr lang="en-US" dirty="0"/>
@@ -715,35 +715,35 @@
           <a:p>
             <a:pPr lvl="0"/>
             <a:r>
-              <a:rPr lang="en-US" smtClean="0"/>
+              <a:rPr lang="en-US"/>
               <a:t>Click to edit Master text styles</a:t>
             </a:r>
           </a:p>
           <a:p>
             <a:pPr lvl="1"/>
             <a:r>
-              <a:rPr lang="en-US" smtClean="0"/>
+              <a:rPr lang="en-US"/>
               <a:t>Second level</a:t>
             </a:r>
           </a:p>
           <a:p>
             <a:pPr lvl="2"/>
             <a:r>
-              <a:rPr lang="en-US" smtClean="0"/>
+              <a:rPr lang="en-US"/>
               <a:t>Third level</a:t>
             </a:r>
           </a:p>
           <a:p>
             <a:pPr lvl="3"/>
             <a:r>
-              <a:rPr lang="en-US" smtClean="0"/>
+              <a:rPr lang="en-US"/>
               <a:t>Fourth level</a:t>
             </a:r>
           </a:p>
           <a:p>
             <a:pPr lvl="4"/>
             <a:r>
-              <a:rPr lang="en-US" smtClean="0"/>
+              <a:rPr lang="en-US"/>
               <a:t>Fifth level</a:t>
             </a:r>
             <a:endParaRPr lang="en-US" dirty="0"/>
@@ -809,7 +809,7 @@
           <a:p>
             <a:fld id="{0E1C6588-574C-564D-9A5F-65E9E31ED340}" type="slidenum">
               <a:rPr lang="fr-FR" smtClean="0"/>
-              <a:t>‹#›</a:t>
+              <a:t>‹N°›</a:t>
             </a:fld>
             <a:endParaRPr lang="fr-FR"/>
           </a:p>
@@ -870,7 +870,7 @@
           </a:lstStyle>
           <a:p>
             <a:r>
-              <a:rPr lang="en-US" smtClean="0"/>
+              <a:rPr lang="en-US"/>
               <a:t>Click to edit Master title style</a:t>
             </a:r>
             <a:endParaRPr lang="en-US" dirty="0"/>
@@ -988,7 +988,7 @@
           <a:p>
             <a:pPr lvl="0"/>
             <a:r>
-              <a:rPr lang="en-US" smtClean="0"/>
+              <a:rPr lang="en-US"/>
               <a:t>Click to edit Master text styles</a:t>
             </a:r>
           </a:p>
@@ -1053,7 +1053,7 @@
           <a:p>
             <a:fld id="{0E1C6588-574C-564D-9A5F-65E9E31ED340}" type="slidenum">
               <a:rPr lang="fr-FR" smtClean="0"/>
-              <a:t>‹#›</a:t>
+              <a:t>‹N°›</a:t>
             </a:fld>
             <a:endParaRPr lang="fr-FR"/>
           </a:p>
@@ -1105,7 +1105,7 @@
           <a:lstStyle/>
           <a:p>
             <a:r>
-              <a:rPr lang="en-US" smtClean="0"/>
+              <a:rPr lang="en-US"/>
               <a:t>Click to edit Master title style</a:t>
             </a:r>
             <a:endParaRPr lang="en-US" dirty="0"/>
@@ -1134,35 +1134,35 @@
           <a:p>
             <a:pPr lvl="0"/>
             <a:r>
-              <a:rPr lang="en-US" smtClean="0"/>
+              <a:rPr lang="en-US"/>
               <a:t>Click to edit Master text styles</a:t>
             </a:r>
           </a:p>
           <a:p>
             <a:pPr lvl="1"/>
             <a:r>
-              <a:rPr lang="en-US" smtClean="0"/>
+              <a:rPr lang="en-US"/>
               <a:t>Second level</a:t>
             </a:r>
           </a:p>
           <a:p>
             <a:pPr lvl="2"/>
             <a:r>
-              <a:rPr lang="en-US" smtClean="0"/>
+              <a:rPr lang="en-US"/>
               <a:t>Third level</a:t>
             </a:r>
           </a:p>
           <a:p>
             <a:pPr lvl="3"/>
             <a:r>
-              <a:rPr lang="en-US" smtClean="0"/>
+              <a:rPr lang="en-US"/>
               <a:t>Fourth level</a:t>
             </a:r>
           </a:p>
           <a:p>
             <a:pPr lvl="4"/>
             <a:r>
-              <a:rPr lang="en-US" smtClean="0"/>
+              <a:rPr lang="en-US"/>
               <a:t>Fifth level</a:t>
             </a:r>
             <a:endParaRPr lang="en-US" dirty="0"/>
@@ -1191,35 +1191,35 @@
           <a:p>
             <a:pPr lvl="0"/>
             <a:r>
-              <a:rPr lang="en-US" smtClean="0"/>
+              <a:rPr lang="en-US"/>
               <a:t>Click to edit Master text styles</a:t>
             </a:r>
           </a:p>
           <a:p>
             <a:pPr lvl="1"/>
             <a:r>
-              <a:rPr lang="en-US" smtClean="0"/>
+              <a:rPr lang="en-US"/>
               <a:t>Second level</a:t>
             </a:r>
           </a:p>
           <a:p>
             <a:pPr lvl="2"/>
             <a:r>
-              <a:rPr lang="en-US" smtClean="0"/>
+              <a:rPr lang="en-US"/>
               <a:t>Third level</a:t>
             </a:r>
           </a:p>
           <a:p>
             <a:pPr lvl="3"/>
             <a:r>
-              <a:rPr lang="en-US" smtClean="0"/>
+              <a:rPr lang="en-US"/>
               <a:t>Fourth level</a:t>
             </a:r>
           </a:p>
           <a:p>
             <a:pPr lvl="4"/>
             <a:r>
-              <a:rPr lang="en-US" smtClean="0"/>
+              <a:rPr lang="en-US"/>
               <a:t>Fifth level</a:t>
             </a:r>
             <a:endParaRPr lang="en-US" dirty="0"/>
@@ -1285,7 +1285,7 @@
           <a:p>
             <a:fld id="{0E1C6588-574C-564D-9A5F-65E9E31ED340}" type="slidenum">
               <a:rPr lang="fr-FR" smtClean="0"/>
-              <a:t>‹#›</a:t>
+              <a:t>‹N°›</a:t>
             </a:fld>
             <a:endParaRPr lang="fr-FR"/>
           </a:p>
@@ -1342,7 +1342,7 @@
           <a:lstStyle/>
           <a:p>
             <a:r>
-              <a:rPr lang="en-US" smtClean="0"/>
+              <a:rPr lang="en-US"/>
               <a:t>Click to edit Master title style</a:t>
             </a:r>
             <a:endParaRPr lang="en-US" dirty="0"/>
@@ -1408,7 +1408,7 @@
           <a:p>
             <a:pPr lvl="0"/>
             <a:r>
-              <a:rPr lang="en-US" smtClean="0"/>
+              <a:rPr lang="en-US"/>
               <a:t>Click to edit Master text styles</a:t>
             </a:r>
           </a:p>
@@ -1436,35 +1436,35 @@
           <a:p>
             <a:pPr lvl="0"/>
             <a:r>
-              <a:rPr lang="en-US" smtClean="0"/>
+              <a:rPr lang="en-US"/>
               <a:t>Click to edit Master text styles</a:t>
             </a:r>
           </a:p>
           <a:p>
             <a:pPr lvl="1"/>
             <a:r>
-              <a:rPr lang="en-US" smtClean="0"/>
+              <a:rPr lang="en-US"/>
               <a:t>Second level</a:t>
             </a:r>
           </a:p>
           <a:p>
             <a:pPr lvl="2"/>
             <a:r>
-              <a:rPr lang="en-US" smtClean="0"/>
+              <a:rPr lang="en-US"/>
               <a:t>Third level</a:t>
             </a:r>
           </a:p>
           <a:p>
             <a:pPr lvl="3"/>
             <a:r>
-              <a:rPr lang="en-US" smtClean="0"/>
+              <a:rPr lang="en-US"/>
               <a:t>Fourth level</a:t>
             </a:r>
           </a:p>
           <a:p>
             <a:pPr lvl="4"/>
             <a:r>
-              <a:rPr lang="en-US" smtClean="0"/>
+              <a:rPr lang="en-US"/>
               <a:t>Fifth level</a:t>
             </a:r>
             <a:endParaRPr lang="en-US" dirty="0"/>
@@ -1530,7 +1530,7 @@
           <a:p>
             <a:pPr lvl="0"/>
             <a:r>
-              <a:rPr lang="en-US" smtClean="0"/>
+              <a:rPr lang="en-US"/>
               <a:t>Click to edit Master text styles</a:t>
             </a:r>
           </a:p>
@@ -1558,35 +1558,35 @@
           <a:p>
             <a:pPr lvl="0"/>
             <a:r>
-              <a:rPr lang="en-US" smtClean="0"/>
+              <a:rPr lang="en-US"/>
               <a:t>Click to edit Master text styles</a:t>
             </a:r>
           </a:p>
           <a:p>
             <a:pPr lvl="1"/>
             <a:r>
-              <a:rPr lang="en-US" smtClean="0"/>
+              <a:rPr lang="en-US"/>
               <a:t>Second level</a:t>
             </a:r>
           </a:p>
           <a:p>
             <a:pPr lvl="2"/>
             <a:r>
-              <a:rPr lang="en-US" smtClean="0"/>
+              <a:rPr lang="en-US"/>
               <a:t>Third level</a:t>
             </a:r>
           </a:p>
           <a:p>
             <a:pPr lvl="3"/>
             <a:r>
-              <a:rPr lang="en-US" smtClean="0"/>
+              <a:rPr lang="en-US"/>
               <a:t>Fourth level</a:t>
             </a:r>
           </a:p>
           <a:p>
             <a:pPr lvl="4"/>
             <a:r>
-              <a:rPr lang="en-US" smtClean="0"/>
+              <a:rPr lang="en-US"/>
               <a:t>Fifth level</a:t>
             </a:r>
             <a:endParaRPr lang="en-US" dirty="0"/>
@@ -1652,7 +1652,7 @@
           <a:p>
             <a:fld id="{0E1C6588-574C-564D-9A5F-65E9E31ED340}" type="slidenum">
               <a:rPr lang="fr-FR" smtClean="0"/>
-              <a:t>‹#›</a:t>
+              <a:t>‹N°›</a:t>
             </a:fld>
             <a:endParaRPr lang="fr-FR"/>
           </a:p>
@@ -1704,7 +1704,7 @@
           <a:lstStyle/>
           <a:p>
             <a:r>
-              <a:rPr lang="en-US" smtClean="0"/>
+              <a:rPr lang="en-US"/>
               <a:t>Click to edit Master title style</a:t>
             </a:r>
             <a:endParaRPr lang="en-US" dirty="0"/>
@@ -1770,7 +1770,7 @@
           <a:p>
             <a:fld id="{0E1C6588-574C-564D-9A5F-65E9E31ED340}" type="slidenum">
               <a:rPr lang="fr-FR" smtClean="0"/>
-              <a:t>‹#›</a:t>
+              <a:t>‹N°›</a:t>
             </a:fld>
             <a:endParaRPr lang="fr-FR"/>
           </a:p>
@@ -1865,7 +1865,7 @@
           <a:p>
             <a:fld id="{0E1C6588-574C-564D-9A5F-65E9E31ED340}" type="slidenum">
               <a:rPr lang="fr-FR" smtClean="0"/>
-              <a:t>‹#›</a:t>
+              <a:t>‹N°›</a:t>
             </a:fld>
             <a:endParaRPr lang="fr-FR"/>
           </a:p>
@@ -1926,7 +1926,7 @@
           </a:lstStyle>
           <a:p>
             <a:r>
-              <a:rPr lang="en-US" smtClean="0"/>
+              <a:rPr lang="en-US"/>
               <a:t>Click to edit Master title style</a:t>
             </a:r>
             <a:endParaRPr lang="en-US" dirty="0"/>
@@ -1983,35 +1983,35 @@
           <a:p>
             <a:pPr lvl="0"/>
             <a:r>
-              <a:rPr lang="en-US" smtClean="0"/>
+              <a:rPr lang="en-US"/>
               <a:t>Click to edit Master text styles</a:t>
             </a:r>
           </a:p>
           <a:p>
             <a:pPr lvl="1"/>
             <a:r>
-              <a:rPr lang="en-US" smtClean="0"/>
+              <a:rPr lang="en-US"/>
               <a:t>Second level</a:t>
             </a:r>
           </a:p>
           <a:p>
             <a:pPr lvl="2"/>
             <a:r>
-              <a:rPr lang="en-US" smtClean="0"/>
+              <a:rPr lang="en-US"/>
               <a:t>Third level</a:t>
             </a:r>
           </a:p>
           <a:p>
             <a:pPr lvl="3"/>
             <a:r>
-              <a:rPr lang="en-US" smtClean="0"/>
+              <a:rPr lang="en-US"/>
               <a:t>Fourth level</a:t>
             </a:r>
           </a:p>
           <a:p>
             <a:pPr lvl="4"/>
             <a:r>
-              <a:rPr lang="en-US" smtClean="0"/>
+              <a:rPr lang="en-US"/>
               <a:t>Fifth level</a:t>
             </a:r>
             <a:endParaRPr lang="en-US" dirty="0"/>
@@ -2077,7 +2077,7 @@
           <a:p>
             <a:pPr lvl="0"/>
             <a:r>
-              <a:rPr lang="en-US" smtClean="0"/>
+              <a:rPr lang="en-US"/>
               <a:t>Click to edit Master text styles</a:t>
             </a:r>
           </a:p>
@@ -2142,7 +2142,7 @@
           <a:p>
             <a:fld id="{0E1C6588-574C-564D-9A5F-65E9E31ED340}" type="slidenum">
               <a:rPr lang="fr-FR" smtClean="0"/>
-              <a:t>‹#›</a:t>
+              <a:t>‹N°›</a:t>
             </a:fld>
             <a:endParaRPr lang="fr-FR"/>
           </a:p>
@@ -2203,7 +2203,7 @@
           </a:lstStyle>
           <a:p>
             <a:r>
-              <a:rPr lang="en-US" smtClean="0"/>
+              <a:rPr lang="en-US"/>
               <a:t>Click to edit Master title style</a:t>
             </a:r>
             <a:endParaRPr lang="en-US" dirty="0"/>
@@ -2268,7 +2268,7 @@
           </a:lstStyle>
           <a:p>
             <a:r>
-              <a:rPr lang="en-US" smtClean="0"/>
+              <a:rPr lang="en-US"/>
               <a:t>Click icon to add picture</a:t>
             </a:r>
             <a:endParaRPr lang="en-US" dirty="0"/>
@@ -2334,7 +2334,7 @@
           <a:p>
             <a:pPr lvl="0"/>
             <a:r>
-              <a:rPr lang="en-US" smtClean="0"/>
+              <a:rPr lang="en-US"/>
               <a:t>Click to edit Master text styles</a:t>
             </a:r>
           </a:p>
@@ -2399,7 +2399,7 @@
           <a:p>
             <a:fld id="{0E1C6588-574C-564D-9A5F-65E9E31ED340}" type="slidenum">
               <a:rPr lang="fr-FR" smtClean="0"/>
-              <a:t>‹#›</a:t>
+              <a:t>‹N°›</a:t>
             </a:fld>
             <a:endParaRPr lang="fr-FR"/>
           </a:p>
@@ -2466,7 +2466,7 @@
           <a:lstStyle/>
           <a:p>
             <a:r>
-              <a:rPr lang="en-US" smtClean="0"/>
+              <a:rPr lang="en-US"/>
               <a:t>Click to edit Master title style</a:t>
             </a:r>
             <a:endParaRPr lang="en-US" dirty="0"/>
@@ -2500,35 +2500,35 @@
           <a:p>
             <a:pPr lvl="0"/>
             <a:r>
-              <a:rPr lang="en-US" smtClean="0"/>
+              <a:rPr lang="en-US"/>
               <a:t>Click to edit Master text styles</a:t>
             </a:r>
           </a:p>
           <a:p>
             <a:pPr lvl="1"/>
             <a:r>
-              <a:rPr lang="en-US" smtClean="0"/>
+              <a:rPr lang="en-US"/>
               <a:t>Second level</a:t>
             </a:r>
           </a:p>
           <a:p>
             <a:pPr lvl="2"/>
             <a:r>
-              <a:rPr lang="en-US" smtClean="0"/>
+              <a:rPr lang="en-US"/>
               <a:t>Third level</a:t>
             </a:r>
           </a:p>
           <a:p>
             <a:pPr lvl="3"/>
             <a:r>
-              <a:rPr lang="en-US" smtClean="0"/>
+              <a:rPr lang="en-US"/>
               <a:t>Fourth level</a:t>
             </a:r>
           </a:p>
           <a:p>
             <a:pPr lvl="4"/>
             <a:r>
-              <a:rPr lang="en-US" smtClean="0"/>
+              <a:rPr lang="en-US"/>
               <a:t>Fifth level</a:t>
             </a:r>
             <a:endParaRPr lang="en-US" dirty="0"/>
@@ -2648,7 +2648,7 @@
           <a:p>
             <a:fld id="{0E1C6588-574C-564D-9A5F-65E9E31ED340}" type="slidenum">
               <a:rPr lang="fr-FR" smtClean="0"/>
-              <a:t>‹#›</a:t>
+              <a:t>‹N°›</a:t>
             </a:fld>
             <a:endParaRPr lang="fr-FR"/>
           </a:p>
@@ -3230,7 +3230,7 @@
                 <a:ea typeface="Arial" charset="0"/>
                 <a:cs typeface="Arial" charset="0"/>
               </a:rPr>
-              <a:t>Réalisé par Mathieu ROUX et Théo VIEL, encadré par Thierry MARTINEZ</a:t>
+              <a:t>Réalisé par Matthieu ROUX et Théo VIEL, encadré par Thierry MARTINEZ</a:t>
             </a:r>
             <a:endParaRPr lang="fr-FR" sz="1600" b="1" dirty="0">
               <a:solidFill>
@@ -3271,19 +3271,8 @@
                 <a:latin typeface="Arial" panose="020B0604020202020204" pitchFamily="34" charset="0"/>
                 <a:cs typeface="Arial" panose="020B0604020202020204" pitchFamily="34" charset="0"/>
               </a:rPr>
-              <a:t>2- </a:t>
-            </a:r>
-            <a:r>
-              <a:rPr lang="fr-FR" sz="1050" b="1" u="sng" dirty="0" smtClean="0">
-                <a:latin typeface="Arial" panose="020B0604020202020204" pitchFamily="34" charset="0"/>
-                <a:cs typeface="Arial" panose="020B0604020202020204" pitchFamily="34" charset="0"/>
-              </a:rPr>
-              <a:t>Objectif</a:t>
-            </a:r>
-            <a:endParaRPr lang="fr-FR" sz="1050" b="1" u="sng" dirty="0">
-              <a:latin typeface="Arial" panose="020B0604020202020204" pitchFamily="34" charset="0"/>
-              <a:cs typeface="Arial" panose="020B0604020202020204" pitchFamily="34" charset="0"/>
-            </a:endParaRPr>
+              <a:t>2- Objectif</a:t>
+            </a:r>
           </a:p>
           <a:p>
             <a:pPr algn="just"/>
@@ -3459,7 +3448,7 @@
           <a:p>
             <a:pPr algn="just"/>
             <a:r>
-              <a:rPr lang="fr-FR" sz="1600" b="1" dirty="0" smtClean="0">
+              <a:rPr lang="fr-FR" sz="1600" b="1" dirty="0">
                 <a:solidFill>
                   <a:srgbClr val="38ADE3"/>
                 </a:solidFill>
@@ -3473,18 +3462,6 @@
               </a:rPr>
               <a:t>I- Introduction</a:t>
             </a:r>
-            <a:endParaRPr lang="fr-FR" sz="1600" b="1" dirty="0">
-              <a:solidFill>
-                <a:srgbClr val="38ADE3"/>
-              </a:solidFill>
-              <a:uFill>
-                <a:solidFill>
-                  <a:srgbClr val="FF0000"/>
-                </a:solidFill>
-              </a:uFill>
-              <a:latin typeface="Arial" panose="020B0604020202020204" pitchFamily="34" charset="0"/>
-              <a:cs typeface="Arial" panose="020B0604020202020204" pitchFamily="34" charset="0"/>
-            </a:endParaRPr>
           </a:p>
           <a:p>
             <a:pPr algn="just"/>
@@ -3568,21 +3545,7 @@
                 <a:latin typeface="Arial" panose="020B0604020202020204" pitchFamily="34" charset="0"/>
                 <a:cs typeface="Arial" panose="020B0604020202020204" pitchFamily="34" charset="0"/>
               </a:rPr>
-              <a:t>Le puzzle qui nous a été présenté est de taille </a:t>
-            </a:r>
-            <a:r>
-              <a:rPr lang="fr-FR" sz="900" dirty="0" smtClean="0">
-                <a:latin typeface="Arial" panose="020B0604020202020204" pitchFamily="34" charset="0"/>
-                <a:cs typeface="Arial" panose="020B0604020202020204" pitchFamily="34" charset="0"/>
-              </a:rPr>
-              <a:t>7x7. Nous </a:t>
-            </a:r>
-            <a:r>
-              <a:rPr lang="fr-FR" sz="900" dirty="0">
-                <a:latin typeface="Arial" panose="020B0604020202020204" pitchFamily="34" charset="0"/>
-                <a:cs typeface="Arial" panose="020B0604020202020204" pitchFamily="34" charset="0"/>
-              </a:rPr>
-              <a:t>avons ensuite généralisé à d’autres tailles.</a:t>
+              <a:t>Le puzzle qui nous a été présenté est de taille 7x7. Nous avons ensuite généralisé à d’autres tailles.</a:t>
             </a:r>
           </a:p>
         </p:txBody>
@@ -3612,11 +3575,7 @@
             <a:pPr algn="ctr"/>
             <a:r>
               <a:rPr lang="fr-FR" sz="1200" i="1" dirty="0"/>
-              <a:t>Le puzzle à </a:t>
-            </a:r>
-            <a:r>
-              <a:rPr lang="fr-FR" sz="1200" i="1" dirty="0" smtClean="0"/>
-              <a:t>résoudre</a:t>
+              <a:t>Le puzzle à résoudre</a:t>
             </a:r>
           </a:p>
         </p:txBody>
@@ -3647,21 +3606,6 @@
           <a:lstStyle/>
           <a:p>
             <a:pPr algn="just"/>
-            <a:r>
-              <a:rPr lang="fr-FR" sz="2400" b="1" dirty="0" smtClean="0">
-                <a:solidFill>
-                  <a:srgbClr val="38ADE3"/>
-                </a:solidFill>
-                <a:uFill>
-                  <a:solidFill>
-                    <a:srgbClr val="FF0000"/>
-                  </a:solidFill>
-                </a:uFill>
-                <a:latin typeface="Arial" panose="020B0604020202020204" pitchFamily="34" charset="0"/>
-                <a:cs typeface="Arial" panose="020B0604020202020204" pitchFamily="34" charset="0"/>
-              </a:rPr>
-              <a:t>    II- </a:t>
-            </a:r>
             <a:r>
               <a:rPr lang="fr-FR" sz="2400" b="1" dirty="0">
                 <a:solidFill>
@@ -3675,35 +3619,8 @@
                 <a:latin typeface="Arial" panose="020B0604020202020204" pitchFamily="34" charset="0"/>
                 <a:cs typeface="Arial" panose="020B0604020202020204" pitchFamily="34" charset="0"/>
               </a:rPr>
-              <a:t>L’interface graphique </a:t>
-            </a:r>
-            <a:r>
-              <a:rPr lang="fr-FR" sz="2400" b="1" dirty="0" smtClean="0">
-                <a:solidFill>
-                  <a:srgbClr val="38ADE3"/>
-                </a:solidFill>
-                <a:uFill>
-                  <a:solidFill>
-                    <a:srgbClr val="FF0000"/>
-                  </a:solidFill>
-                </a:uFill>
-                <a:latin typeface="Arial" panose="020B0604020202020204" pitchFamily="34" charset="0"/>
-                <a:cs typeface="Arial" panose="020B0604020202020204" pitchFamily="34" charset="0"/>
-              </a:rPr>
-              <a:t>Python</a:t>
-            </a:r>
-            <a:endParaRPr lang="fr-FR" sz="2400" b="1" dirty="0" smtClean="0">
-              <a:solidFill>
-                <a:srgbClr val="38ADE3"/>
-              </a:solidFill>
-              <a:uFill>
-                <a:solidFill>
-                  <a:srgbClr val="FF0000"/>
-                </a:solidFill>
-              </a:uFill>
-              <a:latin typeface="Arial" panose="020B0604020202020204" pitchFamily="34" charset="0"/>
-              <a:cs typeface="Arial" panose="020B0604020202020204" pitchFamily="34" charset="0"/>
-            </a:endParaRPr>
+              <a:t>    II- L’interface graphique Python</a:t>
+            </a:r>
           </a:p>
         </p:txBody>
       </p:sp>
@@ -3778,16 +3695,6 @@
           <a:lstStyle/>
           <a:p>
             <a:r>
-              <a:rPr lang="fr-FR" sz="3200" b="1" dirty="0" smtClean="0">
-                <a:solidFill>
-                  <a:schemeClr val="bg1"/>
-                </a:solidFill>
-                <a:latin typeface="Arial" panose="020B0604020202020204" pitchFamily="34" charset="0"/>
-                <a:cs typeface="Arial" panose="020B0604020202020204" pitchFamily="34" charset="0"/>
-              </a:rPr>
-              <a:t>INTERFACE POUR ALGORITHMES </a:t>
-            </a:r>
-            <a:r>
               <a:rPr lang="fr-FR" sz="3200" b="1" dirty="0">
                 <a:solidFill>
                   <a:schemeClr val="bg1"/>
@@ -3795,7 +3702,7 @@
                 <a:latin typeface="Arial" panose="020B0604020202020204" pitchFamily="34" charset="0"/>
                 <a:cs typeface="Arial" panose="020B0604020202020204" pitchFamily="34" charset="0"/>
               </a:rPr>
-              <a:t>DE RÉSOLUTION DE PUZZLES</a:t>
+              <a:t>INTERFACE POUR ALGORITHMES DE RÉSOLUTION DE PUZZLES</a:t>
             </a:r>
           </a:p>
         </p:txBody>
@@ -3962,7 +3869,7 @@
               <a:t>PROJET </a:t>
             </a:r>
             <a:r>
-              <a:rPr lang="fr-FR" sz="2800" b="1" dirty="0" err="1" smtClean="0">
+              <a:rPr lang="fr-FR" sz="2800" b="1" dirty="0" err="1">
                 <a:solidFill>
                   <a:schemeClr val="bg1"/>
                 </a:solidFill>
@@ -4519,18 +4426,13 @@
           <a:p>
             <a:pPr algn="ctr"/>
             <a:r>
-              <a:rPr lang="fr-FR" sz="1100" b="1" dirty="0" smtClean="0">
+              <a:rPr lang="fr-FR" sz="1100" b="1" dirty="0">
                 <a:solidFill>
                   <a:schemeClr val="tx1"/>
                 </a:solidFill>
               </a:rPr>
               <a:t>MODELE</a:t>
             </a:r>
-            <a:endParaRPr lang="fr-FR" sz="1100" b="1" dirty="0">
-              <a:solidFill>
-                <a:schemeClr val="tx1"/>
-              </a:solidFill>
-            </a:endParaRPr>
           </a:p>
         </p:txBody>
       </p:sp>
@@ -4582,13 +4484,6 @@
   <p:clrMapOvr>
     <a:masterClrMapping/>
   </p:clrMapOvr>
-  <p:timing>
-    <p:tnLst>
-      <p:par>
-        <p:cTn id="1" dur="indefinite" restart="never" nodeType="tmRoot"/>
-      </p:par>
-    </p:tnLst>
-  </p:timing>
 </p:sld>
 </file>
 

</xml_diff>

<commit_message>
Ajout partie interfaçage dans le poster TDLog
</commit_message>
<xml_diff>
--- a/Poster_TdLOG.pptx
+++ b/Poster_TdLOG.pptx
@@ -6,6 +6,7 @@
   </p:sldMasterIdLst>
   <p:sldIdLst>
     <p:sldId id="256" r:id="rId2"/>
+    <p:sldId id="257" r:id="rId3"/>
   </p:sldIdLst>
   <p:sldSz cx="15119350" cy="10691813"/>
   <p:notesSz cx="6858000" cy="9144000"/>
@@ -112,10 +113,6 @@
 </p:presentation>
 </file>
 
-<file path=ppt/revisionInfo.xml><?xml version="1.0" encoding="utf-8"?>
-<p1510:revInfo xmlns:a="http://schemas.openxmlformats.org/drawingml/2006/main" xmlns:r="http://schemas.openxmlformats.org/officeDocument/2006/relationships" xmlns:p1510="http://schemas.microsoft.com/office/powerpoint/2015/10/main"/>
-</file>
-
 <file path=ppt/slideLayouts/slideLayout1.xml><?xml version="1.0" encoding="utf-8"?>
 <p:sldLayout xmlns:a="http://schemas.openxmlformats.org/drawingml/2006/main" xmlns:r="http://schemas.openxmlformats.org/officeDocument/2006/relationships" xmlns:p="http://schemas.openxmlformats.org/presentationml/2006/main" type="title" preserve="1">
   <p:cSld name="Title Slide">
@@ -247,7 +244,7 @@
           <a:p>
             <a:fld id="{A8490EA5-CA6F-8D4B-8D24-9E860C725A80}" type="datetimeFigureOut">
               <a:rPr lang="fr-FR" smtClean="0"/>
-              <a:t>05/02/2018</a:t>
+              <a:t>07/02/2018</a:t>
             </a:fld>
             <a:endParaRPr lang="fr-FR"/>
           </a:p>
@@ -417,7 +414,7 @@
           <a:p>
             <a:fld id="{A8490EA5-CA6F-8D4B-8D24-9E860C725A80}" type="datetimeFigureOut">
               <a:rPr lang="fr-FR" smtClean="0"/>
-              <a:t>05/02/2018</a:t>
+              <a:t>07/02/2018</a:t>
             </a:fld>
             <a:endParaRPr lang="fr-FR"/>
           </a:p>
@@ -597,7 +594,7 @@
           <a:p>
             <a:fld id="{A8490EA5-CA6F-8D4B-8D24-9E860C725A80}" type="datetimeFigureOut">
               <a:rPr lang="fr-FR" smtClean="0"/>
-              <a:t>05/02/2018</a:t>
+              <a:t>07/02/2018</a:t>
             </a:fld>
             <a:endParaRPr lang="fr-FR"/>
           </a:p>
@@ -767,7 +764,7 @@
           <a:p>
             <a:fld id="{A8490EA5-CA6F-8D4B-8D24-9E860C725A80}" type="datetimeFigureOut">
               <a:rPr lang="fr-FR" smtClean="0"/>
-              <a:t>05/02/2018</a:t>
+              <a:t>07/02/2018</a:t>
             </a:fld>
             <a:endParaRPr lang="fr-FR"/>
           </a:p>
@@ -1011,7 +1008,7 @@
           <a:p>
             <a:fld id="{A8490EA5-CA6F-8D4B-8D24-9E860C725A80}" type="datetimeFigureOut">
               <a:rPr lang="fr-FR" smtClean="0"/>
-              <a:t>05/02/2018</a:t>
+              <a:t>07/02/2018</a:t>
             </a:fld>
             <a:endParaRPr lang="fr-FR"/>
           </a:p>
@@ -1243,7 +1240,7 @@
           <a:p>
             <a:fld id="{A8490EA5-CA6F-8D4B-8D24-9E860C725A80}" type="datetimeFigureOut">
               <a:rPr lang="fr-FR" smtClean="0"/>
-              <a:t>05/02/2018</a:t>
+              <a:t>07/02/2018</a:t>
             </a:fld>
             <a:endParaRPr lang="fr-FR"/>
           </a:p>
@@ -1610,7 +1607,7 @@
           <a:p>
             <a:fld id="{A8490EA5-CA6F-8D4B-8D24-9E860C725A80}" type="datetimeFigureOut">
               <a:rPr lang="fr-FR" smtClean="0"/>
-              <a:t>05/02/2018</a:t>
+              <a:t>07/02/2018</a:t>
             </a:fld>
             <a:endParaRPr lang="fr-FR"/>
           </a:p>
@@ -1728,7 +1725,7 @@
           <a:p>
             <a:fld id="{A8490EA5-CA6F-8D4B-8D24-9E860C725A80}" type="datetimeFigureOut">
               <a:rPr lang="fr-FR" smtClean="0"/>
-              <a:t>05/02/2018</a:t>
+              <a:t>07/02/2018</a:t>
             </a:fld>
             <a:endParaRPr lang="fr-FR"/>
           </a:p>
@@ -1823,7 +1820,7 @@
           <a:p>
             <a:fld id="{A8490EA5-CA6F-8D4B-8D24-9E860C725A80}" type="datetimeFigureOut">
               <a:rPr lang="fr-FR" smtClean="0"/>
-              <a:t>05/02/2018</a:t>
+              <a:t>07/02/2018</a:t>
             </a:fld>
             <a:endParaRPr lang="fr-FR"/>
           </a:p>
@@ -2100,7 +2097,7 @@
           <a:p>
             <a:fld id="{A8490EA5-CA6F-8D4B-8D24-9E860C725A80}" type="datetimeFigureOut">
               <a:rPr lang="fr-FR" smtClean="0"/>
-              <a:t>05/02/2018</a:t>
+              <a:t>07/02/2018</a:t>
             </a:fld>
             <a:endParaRPr lang="fr-FR"/>
           </a:p>
@@ -2357,7 +2354,7 @@
           <a:p>
             <a:fld id="{A8490EA5-CA6F-8D4B-8D24-9E860C725A80}" type="datetimeFigureOut">
               <a:rPr lang="fr-FR" smtClean="0"/>
-              <a:t>05/02/2018</a:t>
+              <a:t>07/02/2018</a:t>
             </a:fld>
             <a:endParaRPr lang="fr-FR"/>
           </a:p>
@@ -2570,7 +2567,7 @@
           <a:p>
             <a:fld id="{A8490EA5-CA6F-8D4B-8D24-9E860C725A80}" type="datetimeFigureOut">
               <a:rPr lang="fr-FR" smtClean="0"/>
-              <a:t>05/02/2018</a:t>
+              <a:t>07/02/2018</a:t>
             </a:fld>
             <a:endParaRPr lang="fr-FR"/>
           </a:p>
@@ -2977,6 +2974,63 @@
       </p:grpSpPr>
       <p:sp>
         <p:nvSpPr>
+          <p:cNvPr id="33" name="Rectangle 32"/>
+          <p:cNvSpPr>
+            <a:spLocks noChangeAspect="1"/>
+          </p:cNvSpPr>
+          <p:nvPr/>
+        </p:nvSpPr>
+        <p:spPr>
+          <a:xfrm>
+            <a:off x="11452684" y="1290464"/>
+            <a:ext cx="3419973" cy="8774204"/>
+          </a:xfrm>
+          <a:prstGeom prst="rect">
+            <a:avLst/>
+          </a:prstGeom>
+          <a:solidFill>
+            <a:schemeClr val="bg1"/>
+          </a:solidFill>
+          <a:ln w="19050">
+            <a:solidFill>
+              <a:srgbClr val="38ADE3"/>
+            </a:solidFill>
+          </a:ln>
+          <a:effectLst>
+            <a:outerShdw blurRad="50800" dist="38100" dir="2700000" algn="tl" rotWithShape="0">
+              <a:prstClr val="black">
+                <a:alpha val="40000"/>
+              </a:prstClr>
+            </a:outerShdw>
+          </a:effectLst>
+        </p:spPr>
+        <p:style>
+          <a:lnRef idx="2">
+            <a:schemeClr val="accent1">
+              <a:shade val="50000"/>
+            </a:schemeClr>
+          </a:lnRef>
+          <a:fillRef idx="1">
+            <a:schemeClr val="accent1"/>
+          </a:fillRef>
+          <a:effectRef idx="0">
+            <a:schemeClr val="accent1"/>
+          </a:effectRef>
+          <a:fontRef idx="minor">
+            <a:schemeClr val="lt1"/>
+          </a:fontRef>
+        </p:style>
+        <p:txBody>
+          <a:bodyPr rtlCol="0" anchor="ctr"/>
+          <a:lstStyle/>
+          <a:p>
+            <a:pPr algn="ctr"/>
+            <a:endParaRPr lang="fr-FR"/>
+          </a:p>
+        </p:txBody>
+      </p:sp>
+      <p:sp>
+        <p:nvSpPr>
           <p:cNvPr id="5" name="Round Single Corner Rectangle 4"/>
           <p:cNvSpPr/>
           <p:nvPr/>
@@ -3018,61 +3072,6 @@
           </a:effectRef>
           <a:fontRef idx="minor">
             <a:schemeClr val="dk1"/>
-          </a:fontRef>
-        </p:style>
-        <p:txBody>
-          <a:bodyPr rtlCol="0" anchor="ctr"/>
-          <a:lstStyle/>
-          <a:p>
-            <a:pPr algn="ctr"/>
-            <a:endParaRPr lang="fr-FR"/>
-          </a:p>
-        </p:txBody>
-      </p:sp>
-      <p:sp>
-        <p:nvSpPr>
-          <p:cNvPr id="33" name="Rectangle 32"/>
-          <p:cNvSpPr/>
-          <p:nvPr/>
-        </p:nvSpPr>
-        <p:spPr>
-          <a:xfrm>
-            <a:off x="11419827" y="1175065"/>
-            <a:ext cx="3419973" cy="8774204"/>
-          </a:xfrm>
-          <a:prstGeom prst="rect">
-            <a:avLst/>
-          </a:prstGeom>
-          <a:solidFill>
-            <a:schemeClr val="bg1"/>
-          </a:solidFill>
-          <a:ln w="19050">
-            <a:solidFill>
-              <a:srgbClr val="38ADE3"/>
-            </a:solidFill>
-          </a:ln>
-          <a:effectLst>
-            <a:outerShdw blurRad="50800" dist="38100" dir="2700000" algn="tl" rotWithShape="0">
-              <a:prstClr val="black">
-                <a:alpha val="40000"/>
-              </a:prstClr>
-            </a:outerShdw>
-          </a:effectLst>
-        </p:spPr>
-        <p:style>
-          <a:lnRef idx="2">
-            <a:schemeClr val="accent1">
-              <a:shade val="50000"/>
-            </a:schemeClr>
-          </a:lnRef>
-          <a:fillRef idx="1">
-            <a:schemeClr val="accent1"/>
-          </a:fillRef>
-          <a:effectRef idx="0">
-            <a:schemeClr val="accent1"/>
-          </a:effectRef>
-          <a:fontRef idx="minor">
-            <a:schemeClr val="lt1"/>
           </a:fontRef>
         </p:style>
         <p:txBody>
@@ -4242,6 +4241,7 @@
         <p:nvCxnSpPr>
           <p:cNvPr id="58" name="Straight Connector 57"/>
           <p:cNvCxnSpPr>
+            <a:cxnSpLocks/>
             <a:stCxn id="12" idx="1"/>
             <a:endCxn id="9" idx="3"/>
           </p:cNvCxnSpPr>
@@ -4474,10 +4474,1400 @@
           </a:fontRef>
         </p:style>
       </p:cxnSp>
+      <p:sp>
+        <p:nvSpPr>
+          <p:cNvPr id="36" name="TextBox 19">
+            <a:extLst>
+              <a:ext uri="{FF2B5EF4-FFF2-40B4-BE49-F238E27FC236}">
+                <a16:creationId xmlns:a16="http://schemas.microsoft.com/office/drawing/2014/main" id="{52C351B5-9D55-4196-9C9C-897CA5F52C1E}"/>
+              </a:ext>
+            </a:extLst>
+          </p:cNvPr>
+          <p:cNvSpPr txBox="1"/>
+          <p:nvPr/>
+        </p:nvSpPr>
+        <p:spPr>
+          <a:xfrm>
+            <a:off x="11428301" y="1310141"/>
+            <a:ext cx="3437852" cy="338554"/>
+          </a:xfrm>
+          <a:prstGeom prst="rect">
+            <a:avLst/>
+          </a:prstGeom>
+          <a:noFill/>
+          <a:ln>
+            <a:noFill/>
+          </a:ln>
+        </p:spPr>
+        <p:txBody>
+          <a:bodyPr wrap="square" rtlCol="0">
+            <a:spAutoFit/>
+          </a:bodyPr>
+          <a:lstStyle/>
+          <a:p>
+            <a:r>
+              <a:rPr lang="fr-FR" sz="1600" b="1" dirty="0">
+                <a:solidFill>
+                  <a:srgbClr val="38ADE3"/>
+                </a:solidFill>
+                <a:uFill>
+                  <a:solidFill>
+                    <a:srgbClr val="FF0000"/>
+                  </a:solidFill>
+                </a:uFill>
+                <a:latin typeface="Arial" panose="020B0604020202020204" pitchFamily="34" charset="0"/>
+                <a:cs typeface="Arial" panose="020B0604020202020204" pitchFamily="34" charset="0"/>
+              </a:rPr>
+              <a:t>II- L’interfaçage Python – C++</a:t>
+            </a:r>
+          </a:p>
+        </p:txBody>
+      </p:sp>
+      <p:sp>
+        <p:nvSpPr>
+          <p:cNvPr id="17" name="ZoneTexte 16">
+            <a:extLst>
+              <a:ext uri="{FF2B5EF4-FFF2-40B4-BE49-F238E27FC236}">
+                <a16:creationId xmlns:a16="http://schemas.microsoft.com/office/drawing/2014/main" id="{C8FD1004-C4FD-4407-AFAD-C4D01DB78215}"/>
+              </a:ext>
+            </a:extLst>
+          </p:cNvPr>
+          <p:cNvSpPr txBox="1"/>
+          <p:nvPr/>
+        </p:nvSpPr>
+        <p:spPr>
+          <a:xfrm>
+            <a:off x="11452685" y="1704472"/>
+            <a:ext cx="3413468" cy="2308324"/>
+          </a:xfrm>
+          <a:prstGeom prst="rect">
+            <a:avLst/>
+          </a:prstGeom>
+          <a:noFill/>
+        </p:spPr>
+        <p:txBody>
+          <a:bodyPr wrap="square" rtlCol="0">
+            <a:spAutoFit/>
+          </a:bodyPr>
+          <a:lstStyle/>
+          <a:p>
+            <a:r>
+              <a:rPr lang="fr-FR" sz="900" dirty="0">
+                <a:latin typeface="Arial" panose="020B0604020202020204" pitchFamily="34" charset="0"/>
+                <a:cs typeface="Arial" panose="020B0604020202020204" pitchFamily="34" charset="0"/>
+              </a:rPr>
+              <a:t>    Les enjeux de l’interfaçage entre ces deux langages de programmation sont simples :</a:t>
+            </a:r>
+          </a:p>
+          <a:p>
+            <a:pPr marL="171450" indent="-171450">
+              <a:buFontTx/>
+              <a:buChar char="-"/>
+            </a:pPr>
+            <a:r>
+              <a:rPr lang="fr-FR" sz="900" dirty="0">
+                <a:latin typeface="Arial" panose="020B0604020202020204" pitchFamily="34" charset="0"/>
+                <a:cs typeface="Arial" panose="020B0604020202020204" pitchFamily="34" charset="0"/>
+              </a:rPr>
+              <a:t>Tirer profit de la rapidité des calculs en C++</a:t>
+            </a:r>
+          </a:p>
+          <a:p>
+            <a:pPr marL="171450" indent="-171450">
+              <a:buFontTx/>
+              <a:buChar char="-"/>
+            </a:pPr>
+            <a:r>
+              <a:rPr lang="fr-FR" sz="900" dirty="0">
+                <a:latin typeface="Arial" panose="020B0604020202020204" pitchFamily="34" charset="0"/>
+                <a:cs typeface="Arial" panose="020B0604020202020204" pitchFamily="34" charset="0"/>
+              </a:rPr>
+              <a:t>Les données du puzzle sont envoyées à un exécutable qui calcule toutes les solutions, via le fichier DonneesPuzzle.txt</a:t>
+            </a:r>
+          </a:p>
+          <a:p>
+            <a:pPr marL="171450" indent="-171450">
+              <a:buFontTx/>
+              <a:buChar char="-"/>
+            </a:pPr>
+            <a:r>
+              <a:rPr lang="fr-FR" sz="900" dirty="0">
+                <a:latin typeface="Arial" panose="020B0604020202020204" pitchFamily="34" charset="0"/>
+                <a:cs typeface="Arial" panose="020B0604020202020204" pitchFamily="34" charset="0"/>
+              </a:rPr>
+              <a:t>Les solutions sont renvoyées à l’interface graphique Python, via le fichier ResultatPuzzle.csv</a:t>
+            </a:r>
+          </a:p>
+          <a:p>
+            <a:pPr marL="171450" indent="-171450">
+              <a:buFontTx/>
+              <a:buChar char="-"/>
+            </a:pPr>
+            <a:endParaRPr lang="fr-FR" sz="900" dirty="0">
+              <a:latin typeface="Arial" panose="020B0604020202020204" pitchFamily="34" charset="0"/>
+              <a:cs typeface="Arial" panose="020B0604020202020204" pitchFamily="34" charset="0"/>
+            </a:endParaRPr>
+          </a:p>
+          <a:p>
+            <a:r>
+              <a:rPr lang="fr-FR" sz="900" dirty="0">
+                <a:latin typeface="Arial" panose="020B0604020202020204" pitchFamily="34" charset="0"/>
+                <a:cs typeface="Arial" panose="020B0604020202020204" pitchFamily="34" charset="0"/>
+              </a:rPr>
+              <a:t>   Nous avons donc utilisé deux fichiers temporaires, DonneesPuzzle.txt et ResultatPuzzle.csv afin de permettre l’échange de données entre le code Python et l’exécutable C++.</a:t>
+            </a:r>
+          </a:p>
+          <a:p>
+            <a:endParaRPr lang="fr-FR" sz="900" dirty="0">
+              <a:latin typeface="Arial" panose="020B0604020202020204" pitchFamily="34" charset="0"/>
+              <a:cs typeface="Arial" panose="020B0604020202020204" pitchFamily="34" charset="0"/>
+            </a:endParaRPr>
+          </a:p>
+          <a:p>
+            <a:r>
+              <a:rPr lang="fr-FR" sz="900" dirty="0">
+                <a:latin typeface="Arial" panose="020B0604020202020204" pitchFamily="34" charset="0"/>
+                <a:cs typeface="Arial" panose="020B0604020202020204" pitchFamily="34" charset="0"/>
+              </a:rPr>
+              <a:t>    Lorsque l’utilisateur choisit de résoudre un puzzle par la méthode exhaustive et qu’il appuie sur Solve, le déroulement schématique du code est le suivant :</a:t>
+            </a:r>
+          </a:p>
+        </p:txBody>
+      </p:sp>
+      <p:sp>
+        <p:nvSpPr>
+          <p:cNvPr id="6" name="ZoneTexte 5">
+            <a:extLst>
+              <a:ext uri="{FF2B5EF4-FFF2-40B4-BE49-F238E27FC236}">
+                <a16:creationId xmlns:a16="http://schemas.microsoft.com/office/drawing/2014/main" id="{E5D86183-2AF5-465E-BD83-402923212482}"/>
+              </a:ext>
+            </a:extLst>
+          </p:cNvPr>
+          <p:cNvSpPr txBox="1"/>
+          <p:nvPr/>
+        </p:nvSpPr>
+        <p:spPr>
+          <a:xfrm>
+            <a:off x="13285815" y="4123467"/>
+            <a:ext cx="1443208" cy="261610"/>
+          </a:xfrm>
+          <a:prstGeom prst="rect">
+            <a:avLst/>
+          </a:prstGeom>
+          <a:noFill/>
+        </p:spPr>
+        <p:txBody>
+          <a:bodyPr wrap="square" rtlCol="0">
+            <a:spAutoFit/>
+          </a:bodyPr>
+          <a:lstStyle/>
+          <a:p>
+            <a:pPr algn="ctr"/>
+            <a:r>
+              <a:rPr lang="fr-FR" sz="1100" i="1" dirty="0" err="1"/>
+              <a:t>transformExhaustive</a:t>
+            </a:r>
+            <a:r>
+              <a:rPr lang="fr-FR" sz="1100" i="1" dirty="0"/>
+              <a:t>()</a:t>
+            </a:r>
+          </a:p>
+        </p:txBody>
+      </p:sp>
+      <p:sp>
+        <p:nvSpPr>
+          <p:cNvPr id="18" name="Ellipse 17">
+            <a:extLst>
+              <a:ext uri="{FF2B5EF4-FFF2-40B4-BE49-F238E27FC236}">
+                <a16:creationId xmlns:a16="http://schemas.microsoft.com/office/drawing/2014/main" id="{46CAA5F6-B349-4D37-B5EB-9BFDB4EC3934}"/>
+              </a:ext>
+            </a:extLst>
+          </p:cNvPr>
+          <p:cNvSpPr/>
+          <p:nvPr/>
+        </p:nvSpPr>
+        <p:spPr>
+          <a:xfrm>
+            <a:off x="12161024" y="6856838"/>
+            <a:ext cx="1124791" cy="489964"/>
+          </a:xfrm>
+          <a:prstGeom prst="ellipse">
+            <a:avLst/>
+          </a:prstGeom>
+          <a:solidFill>
+            <a:schemeClr val="accent2">
+              <a:lumMod val="40000"/>
+              <a:lumOff val="60000"/>
+            </a:schemeClr>
+          </a:solidFill>
+          <a:ln>
+            <a:solidFill>
+              <a:schemeClr val="accent5"/>
+            </a:solidFill>
+          </a:ln>
+        </p:spPr>
+        <p:style>
+          <a:lnRef idx="2">
+            <a:schemeClr val="accent1">
+              <a:shade val="50000"/>
+            </a:schemeClr>
+          </a:lnRef>
+          <a:fillRef idx="1">
+            <a:schemeClr val="accent1"/>
+          </a:fillRef>
+          <a:effectRef idx="0">
+            <a:schemeClr val="accent1"/>
+          </a:effectRef>
+          <a:fontRef idx="minor">
+            <a:schemeClr val="lt1"/>
+          </a:fontRef>
+        </p:style>
+        <p:txBody>
+          <a:bodyPr rtlCol="0" anchor="ctr"/>
+          <a:lstStyle/>
+          <a:p>
+            <a:pPr algn="ctr"/>
+            <a:r>
+              <a:rPr lang="fr-FR" sz="1100" b="1" dirty="0">
+                <a:solidFill>
+                  <a:schemeClr val="tx1"/>
+                </a:solidFill>
+              </a:rPr>
+              <a:t>Puzzle.exe</a:t>
+            </a:r>
+          </a:p>
+        </p:txBody>
+      </p:sp>
+      <p:cxnSp>
+        <p:nvCxnSpPr>
+          <p:cNvPr id="21" name="Connecteur droit avec flèche 20">
+            <a:extLst>
+              <a:ext uri="{FF2B5EF4-FFF2-40B4-BE49-F238E27FC236}">
+                <a16:creationId xmlns:a16="http://schemas.microsoft.com/office/drawing/2014/main" id="{6845D71C-5FB5-4D24-B7BD-02D3C6A2FF74}"/>
+              </a:ext>
+            </a:extLst>
+          </p:cNvPr>
+          <p:cNvCxnSpPr>
+            <a:cxnSpLocks/>
+          </p:cNvCxnSpPr>
+          <p:nvPr/>
+        </p:nvCxnSpPr>
+        <p:spPr>
+          <a:xfrm>
+            <a:off x="13068312" y="4254272"/>
+            <a:ext cx="269331" cy="0"/>
+          </a:xfrm>
+          <a:prstGeom prst="straightConnector1">
+            <a:avLst/>
+          </a:prstGeom>
+          <a:ln>
+            <a:tailEnd type="triangle"/>
+          </a:ln>
+        </p:spPr>
+        <p:style>
+          <a:lnRef idx="1">
+            <a:schemeClr val="dk1"/>
+          </a:lnRef>
+          <a:fillRef idx="0">
+            <a:schemeClr val="dk1"/>
+          </a:fillRef>
+          <a:effectRef idx="0">
+            <a:schemeClr val="dk1"/>
+          </a:effectRef>
+          <a:fontRef idx="minor">
+            <a:schemeClr val="tx1"/>
+          </a:fontRef>
+        </p:style>
+      </p:cxnSp>
+      <p:cxnSp>
+        <p:nvCxnSpPr>
+          <p:cNvPr id="54" name="Straight Connector 57">
+            <a:extLst>
+              <a:ext uri="{FF2B5EF4-FFF2-40B4-BE49-F238E27FC236}">
+                <a16:creationId xmlns:a16="http://schemas.microsoft.com/office/drawing/2014/main" id="{998A21BA-52D9-4D13-9655-4B143DD187D6}"/>
+              </a:ext>
+            </a:extLst>
+          </p:cNvPr>
+          <p:cNvCxnSpPr>
+            <a:cxnSpLocks/>
+          </p:cNvCxnSpPr>
+          <p:nvPr/>
+        </p:nvCxnSpPr>
+        <p:spPr>
+          <a:xfrm flipV="1">
+            <a:off x="12320358" y="4365447"/>
+            <a:ext cx="0" cy="145593"/>
+          </a:xfrm>
+          <a:prstGeom prst="line">
+            <a:avLst/>
+          </a:prstGeom>
+          <a:ln w="101600" cmpd="tri">
+            <a:solidFill>
+              <a:srgbClr val="0070C0"/>
+            </a:solidFill>
+          </a:ln>
+        </p:spPr>
+        <p:style>
+          <a:lnRef idx="1">
+            <a:schemeClr val="accent1"/>
+          </a:lnRef>
+          <a:fillRef idx="0">
+            <a:schemeClr val="accent1"/>
+          </a:fillRef>
+          <a:effectRef idx="0">
+            <a:schemeClr val="accent1"/>
+          </a:effectRef>
+          <a:fontRef idx="minor">
+            <a:schemeClr val="tx1"/>
+          </a:fontRef>
+        </p:style>
+      </p:cxnSp>
+      <p:sp>
+        <p:nvSpPr>
+          <p:cNvPr id="62" name="ZoneTexte 61">
+            <a:extLst>
+              <a:ext uri="{FF2B5EF4-FFF2-40B4-BE49-F238E27FC236}">
+                <a16:creationId xmlns:a16="http://schemas.microsoft.com/office/drawing/2014/main" id="{0D889F33-0028-45E5-9CDC-ECFE26B955D2}"/>
+              </a:ext>
+            </a:extLst>
+          </p:cNvPr>
+          <p:cNvSpPr txBox="1"/>
+          <p:nvPr/>
+        </p:nvSpPr>
+        <p:spPr>
+          <a:xfrm>
+            <a:off x="13202977" y="9706641"/>
+            <a:ext cx="1503237" cy="261610"/>
+          </a:xfrm>
+          <a:prstGeom prst="rect">
+            <a:avLst/>
+          </a:prstGeom>
+          <a:noFill/>
+        </p:spPr>
+        <p:txBody>
+          <a:bodyPr wrap="square" rtlCol="0">
+            <a:spAutoFit/>
+          </a:bodyPr>
+          <a:lstStyle/>
+          <a:p>
+            <a:pPr algn="ctr"/>
+            <a:r>
+              <a:rPr lang="fr-FR" sz="1100" i="1" dirty="0"/>
+              <a:t>Affichage des solutions</a:t>
+            </a:r>
+          </a:p>
+        </p:txBody>
+      </p:sp>
+      <p:cxnSp>
+        <p:nvCxnSpPr>
+          <p:cNvPr id="63" name="Connecteur droit avec flèche 62">
+            <a:extLst>
+              <a:ext uri="{FF2B5EF4-FFF2-40B4-BE49-F238E27FC236}">
+                <a16:creationId xmlns:a16="http://schemas.microsoft.com/office/drawing/2014/main" id="{3108AEFD-2566-4C71-88EA-D32C61E9B0B5}"/>
+              </a:ext>
+            </a:extLst>
+          </p:cNvPr>
+          <p:cNvCxnSpPr>
+            <a:cxnSpLocks/>
+          </p:cNvCxnSpPr>
+          <p:nvPr/>
+        </p:nvCxnSpPr>
+        <p:spPr>
+          <a:xfrm>
+            <a:off x="13043845" y="9831148"/>
+            <a:ext cx="241970" cy="0"/>
+          </a:xfrm>
+          <a:prstGeom prst="straightConnector1">
+            <a:avLst/>
+          </a:prstGeom>
+          <a:ln>
+            <a:tailEnd type="triangle"/>
+          </a:ln>
+        </p:spPr>
+        <p:style>
+          <a:lnRef idx="1">
+            <a:schemeClr val="dk1"/>
+          </a:lnRef>
+          <a:fillRef idx="0">
+            <a:schemeClr val="dk1"/>
+          </a:fillRef>
+          <a:effectRef idx="0">
+            <a:schemeClr val="dk1"/>
+          </a:effectRef>
+          <a:fontRef idx="minor">
+            <a:schemeClr val="tx1"/>
+          </a:fontRef>
+        </p:style>
+      </p:cxnSp>
+      <p:cxnSp>
+        <p:nvCxnSpPr>
+          <p:cNvPr id="84" name="Straight Connector 57">
+            <a:extLst>
+              <a:ext uri="{FF2B5EF4-FFF2-40B4-BE49-F238E27FC236}">
+                <a16:creationId xmlns:a16="http://schemas.microsoft.com/office/drawing/2014/main" id="{C1D73C3B-5132-4A41-98EF-691C8BC9B666}"/>
+              </a:ext>
+            </a:extLst>
+          </p:cNvPr>
+          <p:cNvCxnSpPr>
+            <a:cxnSpLocks/>
+          </p:cNvCxnSpPr>
+          <p:nvPr/>
+        </p:nvCxnSpPr>
+        <p:spPr>
+          <a:xfrm flipV="1">
+            <a:off x="12321222" y="4752764"/>
+            <a:ext cx="0" cy="145593"/>
+          </a:xfrm>
+          <a:prstGeom prst="line">
+            <a:avLst/>
+          </a:prstGeom>
+          <a:ln w="101600" cmpd="tri">
+            <a:solidFill>
+              <a:srgbClr val="0070C0"/>
+            </a:solidFill>
+          </a:ln>
+        </p:spPr>
+        <p:style>
+          <a:lnRef idx="1">
+            <a:schemeClr val="accent1"/>
+          </a:lnRef>
+          <a:fillRef idx="0">
+            <a:schemeClr val="accent1"/>
+          </a:fillRef>
+          <a:effectRef idx="0">
+            <a:schemeClr val="accent1"/>
+          </a:effectRef>
+          <a:fontRef idx="minor">
+            <a:schemeClr val="tx1"/>
+          </a:fontRef>
+        </p:style>
+      </p:cxnSp>
+      <p:sp>
+        <p:nvSpPr>
+          <p:cNvPr id="4" name="ZoneTexte 3">
+            <a:extLst>
+              <a:ext uri="{FF2B5EF4-FFF2-40B4-BE49-F238E27FC236}">
+                <a16:creationId xmlns:a16="http://schemas.microsoft.com/office/drawing/2014/main" id="{4BF0AA47-CCC4-43A2-AA25-88F503849D17}"/>
+              </a:ext>
+            </a:extLst>
+          </p:cNvPr>
+          <p:cNvSpPr txBox="1"/>
+          <p:nvPr/>
+        </p:nvSpPr>
+        <p:spPr>
+          <a:xfrm>
+            <a:off x="11652522" y="4506660"/>
+            <a:ext cx="1363962" cy="261610"/>
+          </a:xfrm>
+          <a:prstGeom prst="rect">
+            <a:avLst/>
+          </a:prstGeom>
+          <a:solidFill>
+            <a:srgbClr val="33CCFF"/>
+          </a:solidFill>
+          <a:ln w="12700">
+            <a:solidFill>
+              <a:schemeClr val="accent5"/>
+            </a:solidFill>
+          </a:ln>
+        </p:spPr>
+        <p:txBody>
+          <a:bodyPr wrap="square" rtlCol="0">
+            <a:spAutoFit/>
+          </a:bodyPr>
+          <a:lstStyle/>
+          <a:p>
+            <a:pPr algn="ctr"/>
+            <a:r>
+              <a:rPr lang="fr-FR" sz="1100" b="1" dirty="0"/>
+              <a:t>Envoie des données</a:t>
+            </a:r>
+          </a:p>
+        </p:txBody>
+      </p:sp>
+      <p:sp>
+        <p:nvSpPr>
+          <p:cNvPr id="2" name="ZoneTexte 1">
+            <a:extLst>
+              <a:ext uri="{FF2B5EF4-FFF2-40B4-BE49-F238E27FC236}">
+                <a16:creationId xmlns:a16="http://schemas.microsoft.com/office/drawing/2014/main" id="{C5FC8F77-1DB3-4792-8E68-EE880EFF1AFC}"/>
+              </a:ext>
+            </a:extLst>
+          </p:cNvPr>
+          <p:cNvSpPr txBox="1"/>
+          <p:nvPr/>
+        </p:nvSpPr>
+        <p:spPr>
+          <a:xfrm>
+            <a:off x="11658618" y="4145365"/>
+            <a:ext cx="1357866" cy="241980"/>
+          </a:xfrm>
+          <a:prstGeom prst="rect">
+            <a:avLst/>
+          </a:prstGeom>
+          <a:solidFill>
+            <a:srgbClr val="33CCFF"/>
+          </a:solidFill>
+          <a:ln w="12700">
+            <a:solidFill>
+              <a:schemeClr val="accent5"/>
+            </a:solidFill>
+          </a:ln>
+        </p:spPr>
+        <p:txBody>
+          <a:bodyPr wrap="square" tIns="36000" bIns="36000" rtlCol="0">
+            <a:spAutoFit/>
+          </a:bodyPr>
+          <a:lstStyle/>
+          <a:p>
+            <a:pPr algn="ctr"/>
+            <a:r>
+              <a:rPr lang="fr-FR" sz="1100" b="1" dirty="0"/>
+              <a:t>Python</a:t>
+            </a:r>
+          </a:p>
+        </p:txBody>
+      </p:sp>
+      <p:pic>
+        <p:nvPicPr>
+          <p:cNvPr id="11" name="Image 10" descr="Une image contenant capture d’écran, moniteur&#10;&#10;Description générée avec un niveau de confiance très élevé">
+            <a:extLst>
+              <a:ext uri="{FF2B5EF4-FFF2-40B4-BE49-F238E27FC236}">
+                <a16:creationId xmlns:a16="http://schemas.microsoft.com/office/drawing/2014/main" id="{7758DA01-0396-40D6-9A1A-9DC4CFB92F9E}"/>
+              </a:ext>
+            </a:extLst>
+          </p:cNvPr>
+          <p:cNvPicPr>
+            <a:picLocks noChangeAspect="1"/>
+          </p:cNvPicPr>
+          <p:nvPr/>
+        </p:nvPicPr>
+        <p:blipFill>
+          <a:blip r:embed="rId12"/>
+          <a:stretch>
+            <a:fillRect/>
+          </a:stretch>
+        </p:blipFill>
+        <p:spPr>
+          <a:xfrm>
+            <a:off x="11658618" y="4894099"/>
+            <a:ext cx="2682087" cy="1784475"/>
+          </a:xfrm>
+          <a:prstGeom prst="rect">
+            <a:avLst/>
+          </a:prstGeom>
+        </p:spPr>
+      </p:pic>
+      <p:cxnSp>
+        <p:nvCxnSpPr>
+          <p:cNvPr id="91" name="Straight Connector 57">
+            <a:extLst>
+              <a:ext uri="{FF2B5EF4-FFF2-40B4-BE49-F238E27FC236}">
+                <a16:creationId xmlns:a16="http://schemas.microsoft.com/office/drawing/2014/main" id="{F3A94233-C2D2-4925-BDFE-2A9FB383A27A}"/>
+              </a:ext>
+            </a:extLst>
+          </p:cNvPr>
+          <p:cNvCxnSpPr>
+            <a:cxnSpLocks/>
+          </p:cNvCxnSpPr>
+          <p:nvPr/>
+        </p:nvCxnSpPr>
+        <p:spPr>
+          <a:xfrm flipV="1">
+            <a:off x="12321222" y="7821254"/>
+            <a:ext cx="0" cy="151794"/>
+          </a:xfrm>
+          <a:prstGeom prst="line">
+            <a:avLst/>
+          </a:prstGeom>
+          <a:ln w="101600" cmpd="tri">
+            <a:solidFill>
+              <a:srgbClr val="0070C0"/>
+            </a:solidFill>
+          </a:ln>
+        </p:spPr>
+        <p:style>
+          <a:lnRef idx="1">
+            <a:schemeClr val="accent1"/>
+          </a:lnRef>
+          <a:fillRef idx="0">
+            <a:schemeClr val="accent1"/>
+          </a:fillRef>
+          <a:effectRef idx="0">
+            <a:schemeClr val="accent1"/>
+          </a:effectRef>
+          <a:fontRef idx="minor">
+            <a:schemeClr val="tx1"/>
+          </a:fontRef>
+        </p:style>
+      </p:cxnSp>
+      <p:grpSp>
+        <p:nvGrpSpPr>
+          <p:cNvPr id="38" name="Groupe 37">
+            <a:extLst>
+              <a:ext uri="{FF2B5EF4-FFF2-40B4-BE49-F238E27FC236}">
+                <a16:creationId xmlns:a16="http://schemas.microsoft.com/office/drawing/2014/main" id="{46CA6C66-12D8-451B-9EA5-FA9C92F006AD}"/>
+              </a:ext>
+            </a:extLst>
+          </p:cNvPr>
+          <p:cNvGrpSpPr/>
+          <p:nvPr/>
+        </p:nvGrpSpPr>
+        <p:grpSpPr>
+          <a:xfrm>
+            <a:off x="11649772" y="7979441"/>
+            <a:ext cx="2274692" cy="1587356"/>
+            <a:chOff x="11944959" y="8029130"/>
+            <a:chExt cx="2274692" cy="1587356"/>
+          </a:xfrm>
+        </p:grpSpPr>
+        <p:grpSp>
+          <p:nvGrpSpPr>
+            <p:cNvPr id="77" name="Groupe 76">
+              <a:extLst>
+                <a:ext uri="{FF2B5EF4-FFF2-40B4-BE49-F238E27FC236}">
+                  <a16:creationId xmlns:a16="http://schemas.microsoft.com/office/drawing/2014/main" id="{189325C4-521B-484E-A7B8-FFF2BFDF3F38}"/>
+                </a:ext>
+              </a:extLst>
+            </p:cNvPr>
+            <p:cNvGrpSpPr/>
+            <p:nvPr/>
+          </p:nvGrpSpPr>
+          <p:grpSpPr>
+            <a:xfrm>
+              <a:off x="11978416" y="8085393"/>
+              <a:ext cx="2135345" cy="1311011"/>
+              <a:chOff x="5236516" y="6164622"/>
+              <a:chExt cx="5188333" cy="3185415"/>
+            </a:xfrm>
+          </p:grpSpPr>
+          <p:pic>
+            <p:nvPicPr>
+              <p:cNvPr id="79" name="Image 78">
+                <a:extLst>
+                  <a:ext uri="{FF2B5EF4-FFF2-40B4-BE49-F238E27FC236}">
+                    <a16:creationId xmlns:a16="http://schemas.microsoft.com/office/drawing/2014/main" id="{62D51729-F0D9-4A24-880C-08D835DC95C9}"/>
+                  </a:ext>
+                </a:extLst>
+              </p:cNvPr>
+              <p:cNvPicPr>
+                <a:picLocks noChangeAspect="1"/>
+              </p:cNvPicPr>
+              <p:nvPr/>
+            </p:nvPicPr>
+            <p:blipFill rotWithShape="1">
+              <a:blip r:embed="rId13"/>
+              <a:srcRect l="601" t="8259" r="56350" b="60145"/>
+              <a:stretch/>
+            </p:blipFill>
+            <p:spPr>
+              <a:xfrm>
+                <a:off x="5241087" y="6164622"/>
+                <a:ext cx="5183762" cy="2455503"/>
+              </a:xfrm>
+              <a:prstGeom prst="rect">
+                <a:avLst/>
+              </a:prstGeom>
+              <a:ln>
+                <a:noFill/>
+              </a:ln>
+            </p:spPr>
+          </p:pic>
+          <p:sp>
+            <p:nvSpPr>
+              <p:cNvPr id="80" name="Accolade fermante 79">
+                <a:extLst>
+                  <a:ext uri="{FF2B5EF4-FFF2-40B4-BE49-F238E27FC236}">
+                    <a16:creationId xmlns:a16="http://schemas.microsoft.com/office/drawing/2014/main" id="{161916AA-6580-4880-88A1-8463CDEAE675}"/>
+                  </a:ext>
+                </a:extLst>
+              </p:cNvPr>
+              <p:cNvSpPr/>
+              <p:nvPr/>
+            </p:nvSpPr>
+            <p:spPr>
+              <a:xfrm rot="5400000">
+                <a:off x="5889997" y="7823575"/>
+                <a:ext cx="395291" cy="1693115"/>
+              </a:xfrm>
+              <a:prstGeom prst="rightBrace">
+                <a:avLst>
+                  <a:gd name="adj1" fmla="val 25151"/>
+                  <a:gd name="adj2" fmla="val 46062"/>
+                </a:avLst>
+              </a:prstGeom>
+            </p:spPr>
+            <p:style>
+              <a:lnRef idx="1">
+                <a:schemeClr val="accent2"/>
+              </a:lnRef>
+              <a:fillRef idx="0">
+                <a:schemeClr val="accent2"/>
+              </a:fillRef>
+              <a:effectRef idx="0">
+                <a:schemeClr val="accent2"/>
+              </a:effectRef>
+              <a:fontRef idx="minor">
+                <a:schemeClr val="tx1"/>
+              </a:fontRef>
+            </p:style>
+            <p:txBody>
+              <a:bodyPr rtlCol="0" anchor="ctr"/>
+              <a:lstStyle/>
+              <a:p>
+                <a:pPr algn="ctr"/>
+                <a:endParaRPr lang="fr-FR"/>
+              </a:p>
+            </p:txBody>
+          </p:sp>
+          <p:sp>
+            <p:nvSpPr>
+              <p:cNvPr id="81" name="Accolade fermante 80">
+                <a:extLst>
+                  <a:ext uri="{FF2B5EF4-FFF2-40B4-BE49-F238E27FC236}">
+                    <a16:creationId xmlns:a16="http://schemas.microsoft.com/office/drawing/2014/main" id="{4F81C438-E904-4B4E-96B5-55C2599EDC3C}"/>
+                  </a:ext>
+                </a:extLst>
+              </p:cNvPr>
+              <p:cNvSpPr/>
+              <p:nvPr/>
+            </p:nvSpPr>
+            <p:spPr>
+              <a:xfrm rot="5400000">
+                <a:off x="8507983" y="6950912"/>
+                <a:ext cx="395290" cy="3438440"/>
+              </a:xfrm>
+              <a:prstGeom prst="rightBrace">
+                <a:avLst>
+                  <a:gd name="adj1" fmla="val 25151"/>
+                  <a:gd name="adj2" fmla="val 46062"/>
+                </a:avLst>
+              </a:prstGeom>
+            </p:spPr>
+            <p:style>
+              <a:lnRef idx="1">
+                <a:schemeClr val="accent2"/>
+              </a:lnRef>
+              <a:fillRef idx="0">
+                <a:schemeClr val="accent2"/>
+              </a:fillRef>
+              <a:effectRef idx="0">
+                <a:schemeClr val="accent2"/>
+              </a:effectRef>
+              <a:fontRef idx="minor">
+                <a:schemeClr val="tx1"/>
+              </a:fontRef>
+            </p:style>
+            <p:txBody>
+              <a:bodyPr rtlCol="0" anchor="ctr"/>
+              <a:lstStyle/>
+              <a:p>
+                <a:pPr algn="ctr"/>
+                <a:endParaRPr lang="fr-FR"/>
+              </a:p>
+            </p:txBody>
+          </p:sp>
+          <p:sp>
+            <p:nvSpPr>
+              <p:cNvPr id="82" name="ZoneTexte 81">
+                <a:extLst>
+                  <a:ext uri="{FF2B5EF4-FFF2-40B4-BE49-F238E27FC236}">
+                    <a16:creationId xmlns:a16="http://schemas.microsoft.com/office/drawing/2014/main" id="{468995DF-9D62-44E6-A41F-16F46DE6B50A}"/>
+                  </a:ext>
+                </a:extLst>
+              </p:cNvPr>
+              <p:cNvSpPr txBox="1"/>
+              <p:nvPr/>
+            </p:nvSpPr>
+            <p:spPr>
+              <a:xfrm>
+                <a:off x="5236516" y="8931471"/>
+                <a:ext cx="1874089" cy="418566"/>
+              </a:xfrm>
+              <a:prstGeom prst="rect">
+                <a:avLst/>
+              </a:prstGeom>
+              <a:noFill/>
+            </p:spPr>
+            <p:txBody>
+              <a:bodyPr wrap="square" rtlCol="0">
+                <a:spAutoFit/>
+              </a:bodyPr>
+              <a:lstStyle/>
+              <a:p>
+                <a:pPr algn="ctr"/>
+                <a:r>
+                  <a:rPr lang="fr-FR" sz="900" dirty="0"/>
+                  <a:t>Indice des pièces</a:t>
+                </a:r>
+              </a:p>
+            </p:txBody>
+          </p:sp>
+          <p:sp>
+            <p:nvSpPr>
+              <p:cNvPr id="83" name="ZoneTexte 82">
+                <a:extLst>
+                  <a:ext uri="{FF2B5EF4-FFF2-40B4-BE49-F238E27FC236}">
+                    <a16:creationId xmlns:a16="http://schemas.microsoft.com/office/drawing/2014/main" id="{05470672-2008-430E-9259-23B0A4613CCF}"/>
+                  </a:ext>
+                </a:extLst>
+              </p:cNvPr>
+              <p:cNvSpPr txBox="1"/>
+              <p:nvPr/>
+            </p:nvSpPr>
+            <p:spPr>
+              <a:xfrm>
+                <a:off x="7559675" y="8931471"/>
+                <a:ext cx="2766748" cy="418566"/>
+              </a:xfrm>
+              <a:prstGeom prst="rect">
+                <a:avLst/>
+              </a:prstGeom>
+              <a:noFill/>
+            </p:spPr>
+            <p:txBody>
+              <a:bodyPr wrap="square" rtlCol="0">
+                <a:spAutoFit/>
+              </a:bodyPr>
+              <a:lstStyle/>
+              <a:p>
+                <a:pPr algn="ctr"/>
+                <a:r>
+                  <a:rPr lang="fr-FR" sz="900" dirty="0"/>
+                  <a:t>Indices des cases occupées</a:t>
+                </a:r>
+              </a:p>
+            </p:txBody>
+          </p:sp>
+        </p:grpSp>
+        <p:sp>
+          <p:nvSpPr>
+            <p:cNvPr id="78" name="Rectangle 77">
+              <a:extLst>
+                <a:ext uri="{FF2B5EF4-FFF2-40B4-BE49-F238E27FC236}">
+                  <a16:creationId xmlns:a16="http://schemas.microsoft.com/office/drawing/2014/main" id="{8D4A78E7-9040-4F26-B757-70E4570DCB09}"/>
+                </a:ext>
+              </a:extLst>
+            </p:cNvPr>
+            <p:cNvSpPr/>
+            <p:nvPr/>
+          </p:nvSpPr>
+          <p:spPr>
+            <a:xfrm>
+              <a:off x="11944959" y="8029130"/>
+              <a:ext cx="2274692" cy="1587356"/>
+            </a:xfrm>
+            <a:prstGeom prst="rect">
+              <a:avLst/>
+            </a:prstGeom>
+            <a:noFill/>
+            <a:ln w="6350"/>
+          </p:spPr>
+          <p:style>
+            <a:lnRef idx="2">
+              <a:schemeClr val="accent1">
+                <a:shade val="50000"/>
+              </a:schemeClr>
+            </a:lnRef>
+            <a:fillRef idx="1">
+              <a:schemeClr val="accent1"/>
+            </a:fillRef>
+            <a:effectRef idx="0">
+              <a:schemeClr val="accent1"/>
+            </a:effectRef>
+            <a:fontRef idx="minor">
+              <a:schemeClr val="lt1"/>
+            </a:fontRef>
+          </p:style>
+          <p:txBody>
+            <a:bodyPr rtlCol="0" anchor="ctr"/>
+            <a:lstStyle/>
+            <a:p>
+              <a:pPr algn="ctr"/>
+              <a:endParaRPr lang="fr-FR"/>
+            </a:p>
+          </p:txBody>
+        </p:sp>
+      </p:grpSp>
+      <p:sp>
+        <p:nvSpPr>
+          <p:cNvPr id="40" name="ZoneTexte 39">
+            <a:extLst>
+              <a:ext uri="{FF2B5EF4-FFF2-40B4-BE49-F238E27FC236}">
+                <a16:creationId xmlns:a16="http://schemas.microsoft.com/office/drawing/2014/main" id="{90D6536D-E4D8-49BE-9CBF-EB2C937A06C7}"/>
+              </a:ext>
+            </a:extLst>
+          </p:cNvPr>
+          <p:cNvSpPr txBox="1"/>
+          <p:nvPr/>
+        </p:nvSpPr>
+        <p:spPr>
+          <a:xfrm>
+            <a:off x="11658618" y="7567911"/>
+            <a:ext cx="1754021" cy="261610"/>
+          </a:xfrm>
+          <a:prstGeom prst="rect">
+            <a:avLst/>
+          </a:prstGeom>
+          <a:solidFill>
+            <a:srgbClr val="33CCFF"/>
+          </a:solidFill>
+          <a:ln w="12700">
+            <a:solidFill>
+              <a:schemeClr val="accent5"/>
+            </a:solidFill>
+          </a:ln>
+        </p:spPr>
+        <p:txBody>
+          <a:bodyPr wrap="square" rtlCol="0">
+            <a:spAutoFit/>
+          </a:bodyPr>
+          <a:lstStyle/>
+          <a:p>
+            <a:pPr algn="ctr"/>
+            <a:r>
+              <a:rPr lang="fr-FR" sz="1100" b="1" dirty="0"/>
+              <a:t>Importation des solutions</a:t>
+            </a:r>
+          </a:p>
+        </p:txBody>
+      </p:sp>
+      <p:cxnSp>
+        <p:nvCxnSpPr>
+          <p:cNvPr id="98" name="Straight Connector 57">
+            <a:extLst>
+              <a:ext uri="{FF2B5EF4-FFF2-40B4-BE49-F238E27FC236}">
+                <a16:creationId xmlns:a16="http://schemas.microsoft.com/office/drawing/2014/main" id="{0FEE0ACA-1045-43DB-B795-00EE47206BF5}"/>
+              </a:ext>
+            </a:extLst>
+          </p:cNvPr>
+          <p:cNvCxnSpPr>
+            <a:cxnSpLocks/>
+          </p:cNvCxnSpPr>
+          <p:nvPr/>
+        </p:nvCxnSpPr>
+        <p:spPr>
+          <a:xfrm flipV="1">
+            <a:off x="12321222" y="9562040"/>
+            <a:ext cx="0" cy="151794"/>
+          </a:xfrm>
+          <a:prstGeom prst="line">
+            <a:avLst/>
+          </a:prstGeom>
+          <a:ln w="101600" cmpd="tri">
+            <a:solidFill>
+              <a:srgbClr val="0070C0"/>
+            </a:solidFill>
+          </a:ln>
+        </p:spPr>
+        <p:style>
+          <a:lnRef idx="1">
+            <a:schemeClr val="accent1"/>
+          </a:lnRef>
+          <a:fillRef idx="0">
+            <a:schemeClr val="accent1"/>
+          </a:fillRef>
+          <a:effectRef idx="0">
+            <a:schemeClr val="accent1"/>
+          </a:effectRef>
+          <a:fontRef idx="minor">
+            <a:schemeClr val="tx1"/>
+          </a:fontRef>
+        </p:style>
+      </p:cxnSp>
+      <p:sp>
+        <p:nvSpPr>
+          <p:cNvPr id="97" name="ZoneTexte 96">
+            <a:extLst>
+              <a:ext uri="{FF2B5EF4-FFF2-40B4-BE49-F238E27FC236}">
+                <a16:creationId xmlns:a16="http://schemas.microsoft.com/office/drawing/2014/main" id="{1ABE21E5-E8D1-40F6-948A-DCB391A8B32C}"/>
+              </a:ext>
+            </a:extLst>
+          </p:cNvPr>
+          <p:cNvSpPr txBox="1"/>
+          <p:nvPr/>
+        </p:nvSpPr>
+        <p:spPr>
+          <a:xfrm>
+            <a:off x="11658618" y="9706703"/>
+            <a:ext cx="1357866" cy="241980"/>
+          </a:xfrm>
+          <a:prstGeom prst="rect">
+            <a:avLst/>
+          </a:prstGeom>
+          <a:solidFill>
+            <a:srgbClr val="33CCFF"/>
+          </a:solidFill>
+          <a:ln w="12700">
+            <a:solidFill>
+              <a:schemeClr val="accent5"/>
+            </a:solidFill>
+          </a:ln>
+        </p:spPr>
+        <p:txBody>
+          <a:bodyPr wrap="square" tIns="36000" bIns="36000" rtlCol="0">
+            <a:spAutoFit/>
+          </a:bodyPr>
+          <a:lstStyle/>
+          <a:p>
+            <a:pPr algn="ctr"/>
+            <a:r>
+              <a:rPr lang="fr-FR" sz="1100" b="1" dirty="0"/>
+              <a:t>Python</a:t>
+            </a:r>
+          </a:p>
+        </p:txBody>
+      </p:sp>
     </p:spTree>
     <p:extLst>
       <p:ext uri="{BB962C8B-B14F-4D97-AF65-F5344CB8AC3E}">
         <p14:creationId xmlns:p14="http://schemas.microsoft.com/office/powerpoint/2010/main" val="706812910"/>
+      </p:ext>
+    </p:extLst>
+  </p:cSld>
+  <p:clrMapOvr>
+    <a:masterClrMapping/>
+  </p:clrMapOvr>
+</p:sld>
+</file>
+
+<file path=ppt/slides/slide2.xml><?xml version="1.0" encoding="utf-8"?>
+<p:sld xmlns:a="http://schemas.openxmlformats.org/drawingml/2006/main" xmlns:r="http://schemas.openxmlformats.org/officeDocument/2006/relationships" xmlns:p="http://schemas.openxmlformats.org/presentationml/2006/main">
+  <p:cSld>
+    <p:spTree>
+      <p:nvGrpSpPr>
+        <p:cNvPr id="1" name=""/>
+        <p:cNvGrpSpPr/>
+        <p:nvPr/>
+      </p:nvGrpSpPr>
+      <p:grpSpPr>
+        <a:xfrm>
+          <a:off x="0" y="0"/>
+          <a:ext cx="0" cy="0"/>
+          <a:chOff x="0" y="0"/>
+          <a:chExt cx="0" cy="0"/>
+        </a:xfrm>
+      </p:grpSpPr>
+      <p:pic>
+        <p:nvPicPr>
+          <p:cNvPr id="4" name="Image 3">
+            <a:extLst>
+              <a:ext uri="{FF2B5EF4-FFF2-40B4-BE49-F238E27FC236}">
+                <a16:creationId xmlns:a16="http://schemas.microsoft.com/office/drawing/2014/main" id="{0D2AEF91-2D9E-442A-B3F4-65280C8FDEE2}"/>
+              </a:ext>
+            </a:extLst>
+          </p:cNvPr>
+          <p:cNvPicPr>
+            <a:picLocks noChangeAspect="1"/>
+          </p:cNvPicPr>
+          <p:nvPr/>
+        </p:nvPicPr>
+        <p:blipFill rotWithShape="1">
+          <a:blip r:embed="rId2"/>
+          <a:srcRect l="601" t="8260" r="5950" b="5312"/>
+          <a:stretch/>
+        </p:blipFill>
+        <p:spPr>
+          <a:xfrm>
+            <a:off x="3638550" y="2711448"/>
+            <a:ext cx="5070021" cy="3026412"/>
+          </a:xfrm>
+          <a:prstGeom prst="rect">
+            <a:avLst/>
+          </a:prstGeom>
+        </p:spPr>
+      </p:pic>
+      <p:grpSp>
+        <p:nvGrpSpPr>
+          <p:cNvPr id="17" name="Groupe 16">
+            <a:extLst>
+              <a:ext uri="{FF2B5EF4-FFF2-40B4-BE49-F238E27FC236}">
+                <a16:creationId xmlns:a16="http://schemas.microsoft.com/office/drawing/2014/main" id="{1F529E24-D938-496F-B740-7734CB0A518B}"/>
+              </a:ext>
+            </a:extLst>
+          </p:cNvPr>
+          <p:cNvGrpSpPr/>
+          <p:nvPr/>
+        </p:nvGrpSpPr>
+        <p:grpSpPr>
+          <a:xfrm>
+            <a:off x="6731000" y="6953250"/>
+            <a:ext cx="3048000" cy="1905000"/>
+            <a:chOff x="6731000" y="6731000"/>
+            <a:chExt cx="3048000" cy="1905000"/>
+          </a:xfrm>
+        </p:grpSpPr>
+        <p:grpSp>
+          <p:nvGrpSpPr>
+            <p:cNvPr id="12" name="Groupe 11">
+              <a:extLst>
+                <a:ext uri="{FF2B5EF4-FFF2-40B4-BE49-F238E27FC236}">
+                  <a16:creationId xmlns:a16="http://schemas.microsoft.com/office/drawing/2014/main" id="{DDBE70FA-36EC-4A49-AA24-AA9A23691097}"/>
+                </a:ext>
+              </a:extLst>
+            </p:cNvPr>
+            <p:cNvGrpSpPr/>
+            <p:nvPr/>
+          </p:nvGrpSpPr>
+          <p:grpSpPr>
+            <a:xfrm>
+              <a:off x="6775831" y="6778596"/>
+              <a:ext cx="2861280" cy="1756704"/>
+              <a:chOff x="5236516" y="6164622"/>
+              <a:chExt cx="5188333" cy="3185415"/>
+            </a:xfrm>
+          </p:grpSpPr>
+          <p:pic>
+            <p:nvPicPr>
+              <p:cNvPr id="6" name="Image 5">
+                <a:extLst>
+                  <a:ext uri="{FF2B5EF4-FFF2-40B4-BE49-F238E27FC236}">
+                    <a16:creationId xmlns:a16="http://schemas.microsoft.com/office/drawing/2014/main" id="{BF11CFDA-DE0D-4984-9CFC-35B311178C10}"/>
+                  </a:ext>
+                </a:extLst>
+              </p:cNvPr>
+              <p:cNvPicPr>
+                <a:picLocks noChangeAspect="1"/>
+              </p:cNvPicPr>
+              <p:nvPr/>
+            </p:nvPicPr>
+            <p:blipFill rotWithShape="1">
+              <a:blip r:embed="rId2"/>
+              <a:srcRect l="601" t="8259" r="56350" b="60145"/>
+              <a:stretch/>
+            </p:blipFill>
+            <p:spPr>
+              <a:xfrm>
+                <a:off x="5241087" y="6164622"/>
+                <a:ext cx="5183762" cy="2455503"/>
+              </a:xfrm>
+              <a:prstGeom prst="rect">
+                <a:avLst/>
+              </a:prstGeom>
+              <a:ln>
+                <a:noFill/>
+              </a:ln>
+            </p:spPr>
+          </p:pic>
+          <p:sp>
+            <p:nvSpPr>
+              <p:cNvPr id="7" name="Accolade fermante 6">
+                <a:extLst>
+                  <a:ext uri="{FF2B5EF4-FFF2-40B4-BE49-F238E27FC236}">
+                    <a16:creationId xmlns:a16="http://schemas.microsoft.com/office/drawing/2014/main" id="{7834DDF6-782E-464F-8EFA-BEF620417FE6}"/>
+                  </a:ext>
+                </a:extLst>
+              </p:cNvPr>
+              <p:cNvSpPr/>
+              <p:nvPr/>
+            </p:nvSpPr>
+            <p:spPr>
+              <a:xfrm rot="5400000">
+                <a:off x="5889997" y="7823575"/>
+                <a:ext cx="395291" cy="1693115"/>
+              </a:xfrm>
+              <a:prstGeom prst="rightBrace">
+                <a:avLst>
+                  <a:gd name="adj1" fmla="val 25151"/>
+                  <a:gd name="adj2" fmla="val 46062"/>
+                </a:avLst>
+              </a:prstGeom>
+            </p:spPr>
+            <p:style>
+              <a:lnRef idx="1">
+                <a:schemeClr val="accent2"/>
+              </a:lnRef>
+              <a:fillRef idx="0">
+                <a:schemeClr val="accent2"/>
+              </a:fillRef>
+              <a:effectRef idx="0">
+                <a:schemeClr val="accent2"/>
+              </a:effectRef>
+              <a:fontRef idx="minor">
+                <a:schemeClr val="tx1"/>
+              </a:fontRef>
+            </p:style>
+            <p:txBody>
+              <a:bodyPr rtlCol="0" anchor="ctr"/>
+              <a:lstStyle/>
+              <a:p>
+                <a:pPr algn="ctr"/>
+                <a:endParaRPr lang="fr-FR"/>
+              </a:p>
+            </p:txBody>
+          </p:sp>
+          <p:sp>
+            <p:nvSpPr>
+              <p:cNvPr id="8" name="Accolade fermante 7">
+                <a:extLst>
+                  <a:ext uri="{FF2B5EF4-FFF2-40B4-BE49-F238E27FC236}">
+                    <a16:creationId xmlns:a16="http://schemas.microsoft.com/office/drawing/2014/main" id="{BC3FEA9E-5AAE-4DB9-8D91-4193F306203C}"/>
+                  </a:ext>
+                </a:extLst>
+              </p:cNvPr>
+              <p:cNvSpPr/>
+              <p:nvPr/>
+            </p:nvSpPr>
+            <p:spPr>
+              <a:xfrm rot="5400000">
+                <a:off x="8507983" y="6950912"/>
+                <a:ext cx="395290" cy="3438440"/>
+              </a:xfrm>
+              <a:prstGeom prst="rightBrace">
+                <a:avLst>
+                  <a:gd name="adj1" fmla="val 25151"/>
+                  <a:gd name="adj2" fmla="val 46062"/>
+                </a:avLst>
+              </a:prstGeom>
+            </p:spPr>
+            <p:style>
+              <a:lnRef idx="1">
+                <a:schemeClr val="accent2"/>
+              </a:lnRef>
+              <a:fillRef idx="0">
+                <a:schemeClr val="accent2"/>
+              </a:fillRef>
+              <a:effectRef idx="0">
+                <a:schemeClr val="accent2"/>
+              </a:effectRef>
+              <a:fontRef idx="minor">
+                <a:schemeClr val="tx1"/>
+              </a:fontRef>
+            </p:style>
+            <p:txBody>
+              <a:bodyPr rtlCol="0" anchor="ctr"/>
+              <a:lstStyle/>
+              <a:p>
+                <a:pPr algn="ctr"/>
+                <a:endParaRPr lang="fr-FR"/>
+              </a:p>
+            </p:txBody>
+          </p:sp>
+          <p:sp>
+            <p:nvSpPr>
+              <p:cNvPr id="10" name="ZoneTexte 9">
+                <a:extLst>
+                  <a:ext uri="{FF2B5EF4-FFF2-40B4-BE49-F238E27FC236}">
+                    <a16:creationId xmlns:a16="http://schemas.microsoft.com/office/drawing/2014/main" id="{8000C1E3-ADDB-464B-BEEC-EB85AC5567F8}"/>
+                  </a:ext>
+                </a:extLst>
+              </p:cNvPr>
+              <p:cNvSpPr txBox="1"/>
+              <p:nvPr/>
+            </p:nvSpPr>
+            <p:spPr>
+              <a:xfrm>
+                <a:off x="5236516" y="8931471"/>
+                <a:ext cx="1874089" cy="418566"/>
+              </a:xfrm>
+              <a:prstGeom prst="rect">
+                <a:avLst/>
+              </a:prstGeom>
+              <a:noFill/>
+            </p:spPr>
+            <p:txBody>
+              <a:bodyPr wrap="square" rtlCol="0">
+                <a:spAutoFit/>
+              </a:bodyPr>
+              <a:lstStyle/>
+              <a:p>
+                <a:pPr algn="ctr"/>
+                <a:r>
+                  <a:rPr lang="fr-FR" sz="900" dirty="0"/>
+                  <a:t>Indice des pièces</a:t>
+                </a:r>
+              </a:p>
+            </p:txBody>
+          </p:sp>
+          <p:sp>
+            <p:nvSpPr>
+              <p:cNvPr id="11" name="ZoneTexte 10">
+                <a:extLst>
+                  <a:ext uri="{FF2B5EF4-FFF2-40B4-BE49-F238E27FC236}">
+                    <a16:creationId xmlns:a16="http://schemas.microsoft.com/office/drawing/2014/main" id="{A15788ED-818D-4CA8-98D1-78A71BBC625E}"/>
+                  </a:ext>
+                </a:extLst>
+              </p:cNvPr>
+              <p:cNvSpPr txBox="1"/>
+              <p:nvPr/>
+            </p:nvSpPr>
+            <p:spPr>
+              <a:xfrm>
+                <a:off x="7559675" y="8931471"/>
+                <a:ext cx="2766748" cy="418566"/>
+              </a:xfrm>
+              <a:prstGeom prst="rect">
+                <a:avLst/>
+              </a:prstGeom>
+              <a:noFill/>
+            </p:spPr>
+            <p:txBody>
+              <a:bodyPr wrap="square" rtlCol="0">
+                <a:spAutoFit/>
+              </a:bodyPr>
+              <a:lstStyle/>
+              <a:p>
+                <a:pPr algn="ctr"/>
+                <a:r>
+                  <a:rPr lang="fr-FR" sz="900" dirty="0"/>
+                  <a:t>Indices des cases occupées</a:t>
+                </a:r>
+              </a:p>
+            </p:txBody>
+          </p:sp>
+        </p:grpSp>
+        <p:sp>
+          <p:nvSpPr>
+            <p:cNvPr id="16" name="Rectangle 15">
+              <a:extLst>
+                <a:ext uri="{FF2B5EF4-FFF2-40B4-BE49-F238E27FC236}">
+                  <a16:creationId xmlns:a16="http://schemas.microsoft.com/office/drawing/2014/main" id="{4FCB45A9-F703-4A97-A770-840E92FCAF02}"/>
+                </a:ext>
+              </a:extLst>
+            </p:cNvPr>
+            <p:cNvSpPr/>
+            <p:nvPr/>
+          </p:nvSpPr>
+          <p:spPr>
+            <a:xfrm>
+              <a:off x="6731000" y="6731000"/>
+              <a:ext cx="3048000" cy="1905000"/>
+            </a:xfrm>
+            <a:prstGeom prst="rect">
+              <a:avLst/>
+            </a:prstGeom>
+            <a:noFill/>
+          </p:spPr>
+          <p:style>
+            <a:lnRef idx="2">
+              <a:schemeClr val="accent1">
+                <a:shade val="50000"/>
+              </a:schemeClr>
+            </a:lnRef>
+            <a:fillRef idx="1">
+              <a:schemeClr val="accent1"/>
+            </a:fillRef>
+            <a:effectRef idx="0">
+              <a:schemeClr val="accent1"/>
+            </a:effectRef>
+            <a:fontRef idx="minor">
+              <a:schemeClr val="lt1"/>
+            </a:fontRef>
+          </p:style>
+          <p:txBody>
+            <a:bodyPr rtlCol="0" anchor="ctr"/>
+            <a:lstStyle/>
+            <a:p>
+              <a:pPr algn="ctr"/>
+              <a:endParaRPr lang="fr-FR"/>
+            </a:p>
+          </p:txBody>
+        </p:sp>
+      </p:grpSp>
+    </p:spTree>
+    <p:extLst>
+      <p:ext uri="{BB962C8B-B14F-4D97-AF65-F5344CB8AC3E}">
+        <p14:creationId xmlns:p14="http://schemas.microsoft.com/office/powerpoint/2010/main" val="1664509956"/>
       </p:ext>
     </p:extLst>
   </p:cSld>

</xml_diff>